<commit_message>
updated ppt added demo code
</commit_message>
<xml_diff>
--- a/SLAB.pptx
+++ b/SLAB.pptx
@@ -5,10 +5,10 @@
     <p:sldMasterId id="2147484082" r:id="rId4"/>
   </p:sldMasterIdLst>
   <p:notesMasterIdLst>
-    <p:notesMasterId r:id="rId32"/>
+    <p:notesMasterId r:id="rId35"/>
   </p:notesMasterIdLst>
   <p:handoutMasterIdLst>
-    <p:handoutMasterId r:id="rId33"/>
+    <p:handoutMasterId r:id="rId36"/>
   </p:handoutMasterIdLst>
   <p:sldIdLst>
     <p:sldId id="829" r:id="rId5"/>
@@ -22,22 +22,25 @@
     <p:sldId id="1100" r:id="rId13"/>
     <p:sldId id="1102" r:id="rId14"/>
     <p:sldId id="1105" r:id="rId15"/>
-    <p:sldId id="1101" r:id="rId16"/>
-    <p:sldId id="1121" r:id="rId17"/>
-    <p:sldId id="1122" r:id="rId18"/>
-    <p:sldId id="1107" r:id="rId19"/>
-    <p:sldId id="1108" r:id="rId20"/>
-    <p:sldId id="1117" r:id="rId21"/>
-    <p:sldId id="1110" r:id="rId22"/>
+    <p:sldId id="1126" r:id="rId16"/>
+    <p:sldId id="1127" r:id="rId17"/>
+    <p:sldId id="1128" r:id="rId18"/>
+    <p:sldId id="1101" r:id="rId19"/>
+    <p:sldId id="1121" r:id="rId20"/>
+    <p:sldId id="1122" r:id="rId21"/>
+    <p:sldId id="1129" r:id="rId22"/>
     <p:sldId id="1111" r:id="rId23"/>
-    <p:sldId id="1109" r:id="rId24"/>
-    <p:sldId id="1119" r:id="rId25"/>
-    <p:sldId id="1123" r:id="rId26"/>
-    <p:sldId id="1103" r:id="rId27"/>
-    <p:sldId id="1106" r:id="rId28"/>
-    <p:sldId id="1118" r:id="rId29"/>
-    <p:sldId id="1096" r:id="rId30"/>
-    <p:sldId id="1094" r:id="rId31"/>
+    <p:sldId id="1110" r:id="rId24"/>
+    <p:sldId id="1109" r:id="rId25"/>
+    <p:sldId id="1124" r:id="rId26"/>
+    <p:sldId id="1119" r:id="rId27"/>
+    <p:sldId id="1123" r:id="rId28"/>
+    <p:sldId id="1103" r:id="rId29"/>
+    <p:sldId id="1106" r:id="rId30"/>
+    <p:sldId id="1118" r:id="rId31"/>
+    <p:sldId id="1125" r:id="rId32"/>
+    <p:sldId id="1096" r:id="rId33"/>
+    <p:sldId id="1094" r:id="rId34"/>
   </p:sldIdLst>
   <p:sldSz cx="12436475" cy="6994525"/>
   <p:notesSz cx="6858000" cy="9144000"/>
@@ -3674,7 +3677,7 @@
               <a:rPr lang="en-US" smtClean="0">
                 <a:latin typeface="Segoe UI" pitchFamily="34" charset="0"/>
               </a:rPr>
-              <a:t>5/14/2014</a:t>
+              <a:t>6/13/2014</a:t>
             </a:fld>
             <a:endParaRPr lang="en-US" dirty="0">
               <a:latin typeface="Segoe UI" pitchFamily="34" charset="0"/>
@@ -4108,7 +4111,7 @@
             <a:fld id="{D51B1278-D92B-4AF3-A9C1-71DD298190CE}" type="datetimeFigureOut">
               <a:rPr lang="en-US" smtClean="0"/>
               <a:pPr/>
-              <a:t>5/14/2014</a:t>
+              <a:t>6/13/2014</a:t>
             </a:fld>
             <a:endParaRPr lang="en-US" dirty="0"/>
           </a:p>
@@ -4522,7 +4525,7 @@
           <a:p>
             <a:fld id="{9D1EF732-C8DD-4852-BE53-961CB0EEB3AA}" type="datetime1">
               <a:rPr lang="en-US" smtClean="0"/>
-              <a:t>5/14/2014</a:t>
+              <a:t>6/13/2014</a:t>
             </a:fld>
             <a:endParaRPr lang="en-US" dirty="0"/>
           </a:p>
@@ -4746,7 +4749,7 @@
           <a:p>
             <a:fld id="{3A2E4F47-717B-42D7-9DAD-3BBE3997027B}" type="datetime1">
               <a:rPr lang="en-US" smtClean="0"/>
-              <a:t>5/14/2014</a:t>
+              <a:t>6/13/2014</a:t>
             </a:fld>
             <a:endParaRPr lang="en-US" dirty="0"/>
           </a:p>
@@ -4897,7 +4900,7 @@
                 </a:solidFill>
               </a:rPr>
               <a:pPr/>
-              <a:t>5/14/2014 7:29 AM</a:t>
+              <a:t>6/13/2014 4:30 PM</a:t>
             </a:fld>
             <a:endParaRPr lang="en-US" dirty="0">
               <a:solidFill>
@@ -4929,7 +4932,7 @@
                 </a:solidFill>
               </a:rPr>
               <a:pPr/>
-              <a:t>27</a:t>
+              <a:t>30</a:t>
             </a:fld>
             <a:endParaRPr lang="en-US" dirty="0">
               <a:solidFill>
@@ -8424,12 +8427,12 @@
   <p:extLst mod="1">
     <p:ext uri="{DCECCB84-F9BA-43D5-87BE-67443E8EF086}">
       <p15:sldGuideLst xmlns:p15="http://schemas.microsoft.com/office/powerpoint/2012/main">
-        <p15:guide id="4294967295" orient="horz" pos="1051">
+        <p15:guide id="1" orient="horz" pos="1051">
           <p15:clr>
             <a:srgbClr val="FBAE40"/>
           </p15:clr>
         </p15:guide>
-        <p15:guide id="4294967295" pos="3917">
+        <p15:guide id="2" pos="3917">
           <p15:clr>
             <a:srgbClr val="FBAE40"/>
           </p15:clr>
@@ -9140,12 +9143,12 @@
   <p:extLst mod="1">
     <p:ext uri="{DCECCB84-F9BA-43D5-87BE-67443E8EF086}">
       <p15:sldGuideLst xmlns:p15="http://schemas.microsoft.com/office/powerpoint/2012/main">
-        <p15:guide id="4294967295" orient="horz" pos="2203">
+        <p15:guide id="1" orient="horz" pos="2203">
           <p15:clr>
             <a:srgbClr val="FBAE40"/>
           </p15:clr>
         </p15:guide>
-        <p15:guide id="4294967295" pos="3053">
+        <p15:guide id="2" pos="3053">
           <p15:clr>
             <a:srgbClr val="FBAE40"/>
           </p15:clr>
@@ -11996,6 +11999,359 @@
       </p:grpSpPr>
       <p:sp>
         <p:nvSpPr>
+          <p:cNvPr id="4" name="Title 3"/>
+          <p:cNvSpPr>
+            <a:spLocks noGrp="1"/>
+          </p:cNvSpPr>
+          <p:nvPr>
+            <p:ph type="title"/>
+          </p:nvPr>
+        </p:nvSpPr>
+        <p:spPr/>
+        <p:txBody>
+          <a:bodyPr/>
+          <a:lstStyle/>
+          <a:p>
+            <a:r>
+              <a:rPr lang="en-US" dirty="0" smtClean="0"/>
+              <a:t>Demo – Hello SLAB</a:t>
+            </a:r>
+            <a:endParaRPr lang="en-US" dirty="0"/>
+          </a:p>
+        </p:txBody>
+      </p:sp>
+      <p:sp>
+        <p:nvSpPr>
+          <p:cNvPr id="5" name="Text Placeholder 4"/>
+          <p:cNvSpPr>
+            <a:spLocks noGrp="1"/>
+          </p:cNvSpPr>
+          <p:nvPr>
+            <p:ph type="body" sz="quarter" idx="12"/>
+          </p:nvPr>
+        </p:nvSpPr>
+        <p:spPr/>
+        <p:txBody>
+          <a:bodyPr/>
+          <a:lstStyle/>
+          <a:p>
+            <a:endParaRPr lang="en-US" dirty="0"/>
+          </a:p>
+        </p:txBody>
+      </p:sp>
+    </p:spTree>
+    <p:extLst>
+      <p:ext uri="{BB962C8B-B14F-4D97-AF65-F5344CB8AC3E}">
+        <p14:creationId xmlns:p14="http://schemas.microsoft.com/office/powerpoint/2010/main" val="1967630142"/>
+      </p:ext>
+    </p:extLst>
+  </p:cSld>
+  <p:clrMapOvr>
+    <a:masterClrMapping/>
+  </p:clrMapOvr>
+  <mc:AlternateContent xmlns:mc="http://schemas.openxmlformats.org/markup-compatibility/2006" xmlns:p14="http://schemas.microsoft.com/office/powerpoint/2010/main">
+    <mc:Choice Requires="p14">
+      <p:transition spd="slow" p14:dur="3400">
+        <p14:reveal/>
+      </p:transition>
+    </mc:Choice>
+    <mc:Fallback xmlns="">
+      <p:transition spd="slow">
+        <p:fade/>
+      </p:transition>
+    </mc:Fallback>
+  </mc:AlternateContent>
+</p:sld>
+</file>
+
+<file path=ppt/slides/slide13.xml><?xml version="1.0" encoding="utf-8"?>
+<p:sld xmlns:a="http://schemas.openxmlformats.org/drawingml/2006/main" xmlns:r="http://schemas.openxmlformats.org/officeDocument/2006/relationships" xmlns:p="http://schemas.openxmlformats.org/presentationml/2006/main">
+  <p:cSld>
+    <p:spTree>
+      <p:nvGrpSpPr>
+        <p:cNvPr id="1" name=""/>
+        <p:cNvGrpSpPr/>
+        <p:nvPr/>
+      </p:nvGrpSpPr>
+      <p:grpSpPr>
+        <a:xfrm>
+          <a:off x="0" y="0"/>
+          <a:ext cx="0" cy="0"/>
+          <a:chOff x="0" y="0"/>
+          <a:chExt cx="0" cy="0"/>
+        </a:xfrm>
+      </p:grpSpPr>
+      <p:sp>
+        <p:nvSpPr>
+          <p:cNvPr id="5" name="Text Placeholder 4"/>
+          <p:cNvSpPr>
+            <a:spLocks noGrp="1"/>
+          </p:cNvSpPr>
+          <p:nvPr>
+            <p:ph type="body" sz="quarter" idx="10"/>
+          </p:nvPr>
+        </p:nvSpPr>
+        <p:spPr>
+          <a:xfrm>
+            <a:off x="274638" y="1212850"/>
+            <a:ext cx="11887200" cy="3447098"/>
+          </a:xfrm>
+        </p:spPr>
+        <p:txBody>
+          <a:bodyPr/>
+          <a:lstStyle/>
+          <a:p>
+            <a:r>
+              <a:rPr lang="en-US" dirty="0" smtClean="0"/>
+              <a:t>How to write an event from your app</a:t>
+            </a:r>
+          </a:p>
+          <a:p>
+            <a:r>
+              <a:rPr lang="en-US" dirty="0" smtClean="0"/>
+              <a:t>How to write an event from the </a:t>
+            </a:r>
+            <a:r>
+              <a:rPr lang="en-US" dirty="0" err="1" smtClean="0"/>
+              <a:t>global.asax</a:t>
+            </a:r>
+            <a:endParaRPr lang="en-US" dirty="0" smtClean="0"/>
+          </a:p>
+          <a:p>
+            <a:r>
+              <a:rPr lang="en-US" dirty="0" smtClean="0"/>
+              <a:t>What the event source looks like</a:t>
+            </a:r>
+          </a:p>
+          <a:p>
+            <a:r>
+              <a:rPr lang="en-US" dirty="0" smtClean="0"/>
+              <a:t>Attaching listeners in code</a:t>
+            </a:r>
+          </a:p>
+          <a:p>
+            <a:endParaRPr lang="en-US" dirty="0"/>
+          </a:p>
+        </p:txBody>
+      </p:sp>
+      <p:sp>
+        <p:nvSpPr>
+          <p:cNvPr id="4" name="Title 3"/>
+          <p:cNvSpPr>
+            <a:spLocks noGrp="1"/>
+          </p:cNvSpPr>
+          <p:nvPr>
+            <p:ph type="title"/>
+          </p:nvPr>
+        </p:nvSpPr>
+        <p:spPr/>
+        <p:txBody>
+          <a:bodyPr/>
+          <a:lstStyle/>
+          <a:p>
+            <a:r>
+              <a:rPr lang="en-US" dirty="0"/>
+              <a:t>Hello SLAB</a:t>
+            </a:r>
+          </a:p>
+        </p:txBody>
+      </p:sp>
+    </p:spTree>
+    <p:extLst>
+      <p:ext uri="{BB962C8B-B14F-4D97-AF65-F5344CB8AC3E}">
+        <p14:creationId xmlns:p14="http://schemas.microsoft.com/office/powerpoint/2010/main" val="516782417"/>
+      </p:ext>
+    </p:extLst>
+  </p:cSld>
+  <p:clrMapOvr>
+    <a:masterClrMapping/>
+  </p:clrMapOvr>
+  <p:transition>
+    <p:fade/>
+  </p:transition>
+</p:sld>
+</file>
+
+<file path=ppt/slides/slide14.xml><?xml version="1.0" encoding="utf-8"?>
+<p:sld xmlns:a="http://schemas.openxmlformats.org/drawingml/2006/main" xmlns:r="http://schemas.openxmlformats.org/officeDocument/2006/relationships" xmlns:p="http://schemas.openxmlformats.org/presentationml/2006/main">
+  <p:cSld>
+    <p:spTree>
+      <p:nvGrpSpPr>
+        <p:cNvPr id="1" name=""/>
+        <p:cNvGrpSpPr/>
+        <p:nvPr/>
+      </p:nvGrpSpPr>
+      <p:grpSpPr>
+        <a:xfrm>
+          <a:off x="0" y="0"/>
+          <a:ext cx="0" cy="0"/>
+          <a:chOff x="0" y="0"/>
+          <a:chExt cx="0" cy="0"/>
+        </a:xfrm>
+      </p:grpSpPr>
+      <p:sp>
+        <p:nvSpPr>
+          <p:cNvPr id="2" name="Text Placeholder 1"/>
+          <p:cNvSpPr>
+            <a:spLocks noGrp="1"/>
+          </p:cNvSpPr>
+          <p:nvPr>
+            <p:ph type="body" sz="quarter" idx="10"/>
+          </p:nvPr>
+        </p:nvSpPr>
+        <p:spPr>
+          <a:xfrm>
+            <a:off x="274638" y="1212850"/>
+            <a:ext cx="11887200" cy="4419671"/>
+          </a:xfrm>
+        </p:spPr>
+        <p:txBody>
+          <a:bodyPr/>
+          <a:lstStyle/>
+          <a:p>
+            <a:r>
+              <a:rPr lang="en-US" sz="3200" dirty="0"/>
+              <a:t>Several sinks/destinations:</a:t>
+            </a:r>
+          </a:p>
+          <a:p>
+            <a:pPr lvl="1"/>
+            <a:r>
+              <a:rPr lang="en-US" dirty="0"/>
+              <a:t>Windows Azure Table.</a:t>
+            </a:r>
+          </a:p>
+          <a:p>
+            <a:pPr lvl="1"/>
+            <a:r>
+              <a:rPr lang="en-US" dirty="0"/>
+              <a:t>SQL Database.</a:t>
+            </a:r>
+          </a:p>
+          <a:p>
+            <a:pPr lvl="1"/>
+            <a:r>
+              <a:rPr lang="en-US" dirty="0"/>
+              <a:t>Flat file.</a:t>
+            </a:r>
+          </a:p>
+          <a:p>
+            <a:pPr lvl="1"/>
+            <a:r>
+              <a:rPr lang="en-US" dirty="0"/>
+              <a:t>Rolling flat file.</a:t>
+            </a:r>
+          </a:p>
+          <a:p>
+            <a:pPr lvl="1"/>
+            <a:r>
+              <a:rPr lang="en-US" dirty="0"/>
+              <a:t>Console.</a:t>
+            </a:r>
+          </a:p>
+          <a:p>
+            <a:r>
+              <a:rPr lang="en-US" sz="3200" dirty="0"/>
+              <a:t>Formatters (for text-based sinks):</a:t>
+            </a:r>
+          </a:p>
+          <a:p>
+            <a:pPr lvl="1"/>
+            <a:r>
+              <a:rPr lang="en-US" dirty="0"/>
+              <a:t>JSON.</a:t>
+            </a:r>
+          </a:p>
+          <a:p>
+            <a:pPr lvl="1"/>
+            <a:r>
+              <a:rPr lang="en-US" dirty="0"/>
+              <a:t>XML.</a:t>
+            </a:r>
+          </a:p>
+          <a:p>
+            <a:pPr lvl="1"/>
+            <a:r>
+              <a:rPr lang="en-US" dirty="0"/>
+              <a:t>Natural (plain-text</a:t>
+            </a:r>
+            <a:r>
+              <a:rPr lang="en-US" dirty="0" smtClean="0"/>
+              <a:t>).</a:t>
+            </a:r>
+            <a:endParaRPr lang="en-US" dirty="0"/>
+          </a:p>
+        </p:txBody>
+      </p:sp>
+      <p:sp>
+        <p:nvSpPr>
+          <p:cNvPr id="3" name="Title 2"/>
+          <p:cNvSpPr>
+            <a:spLocks noGrp="1"/>
+          </p:cNvSpPr>
+          <p:nvPr>
+            <p:ph type="title"/>
+          </p:nvPr>
+        </p:nvSpPr>
+        <p:spPr/>
+        <p:txBody>
+          <a:bodyPr/>
+          <a:lstStyle/>
+          <a:p>
+            <a:r>
+              <a:rPr lang="en-US" dirty="0"/>
+              <a:t>Built in Event </a:t>
+            </a:r>
+            <a:r>
+              <a:rPr lang="en-US" dirty="0" smtClean="0"/>
+              <a:t>Sinks &amp; Formatters</a:t>
+            </a:r>
+            <a:r>
+              <a:rPr lang="en-US" dirty="0"/>
+              <a:t/>
+            </a:r>
+            <a:br>
+              <a:rPr lang="en-US" dirty="0"/>
+            </a:br>
+            <a:endParaRPr lang="en-US" dirty="0"/>
+          </a:p>
+        </p:txBody>
+      </p:sp>
+    </p:spTree>
+    <p:extLst>
+      <p:ext uri="{BB962C8B-B14F-4D97-AF65-F5344CB8AC3E}">
+        <p14:creationId xmlns:p14="http://schemas.microsoft.com/office/powerpoint/2010/main" val="2651110888"/>
+      </p:ext>
+    </p:extLst>
+  </p:cSld>
+  <p:clrMapOvr>
+    <a:masterClrMapping/>
+  </p:clrMapOvr>
+  <p:transition>
+    <p:fade/>
+  </p:transition>
+</p:sld>
+</file>
+
+<file path=ppt/slides/slide15.xml><?xml version="1.0" encoding="utf-8"?>
+<p:sld xmlns:a="http://schemas.openxmlformats.org/drawingml/2006/main" xmlns:r="http://schemas.openxmlformats.org/officeDocument/2006/relationships" xmlns:p="http://schemas.openxmlformats.org/presentationml/2006/main">
+  <p:cSld>
+    <p:spTree>
+      <p:nvGrpSpPr>
+        <p:cNvPr id="1" name=""/>
+        <p:cNvGrpSpPr/>
+        <p:nvPr/>
+      </p:nvGrpSpPr>
+      <p:grpSpPr>
+        <a:xfrm>
+          <a:off x="0" y="0"/>
+          <a:ext cx="0" cy="0"/>
+          <a:chOff x="0" y="0"/>
+          <a:chExt cx="0" cy="0"/>
+        </a:xfrm>
+      </p:grpSpPr>
+      <p:sp>
+        <p:nvSpPr>
           <p:cNvPr id="2" name="Text Placeholder 1"/>
           <p:cNvSpPr>
             <a:spLocks noGrp="1"/>
@@ -12109,7 +12465,7 @@
 </p:sld>
 </file>
 
-<file path=ppt/slides/slide13.xml><?xml version="1.0" encoding="utf-8"?>
+<file path=ppt/slides/slide16.xml><?xml version="1.0" encoding="utf-8"?>
 <p:sld xmlns:a="http://schemas.openxmlformats.org/drawingml/2006/main" xmlns:r="http://schemas.openxmlformats.org/officeDocument/2006/relationships" xmlns:p="http://schemas.openxmlformats.org/presentationml/2006/main">
   <p:cSld>
     <p:spTree>
@@ -12195,7 +12551,7 @@
 </p:sld>
 </file>
 
-<file path=ppt/slides/slide14.xml><?xml version="1.0" encoding="utf-8"?>
+<file path=ppt/slides/slide17.xml><?xml version="1.0" encoding="utf-8"?>
 <p:sld xmlns:a="http://schemas.openxmlformats.org/drawingml/2006/main" xmlns:r="http://schemas.openxmlformats.org/officeDocument/2006/relationships" xmlns:p="http://schemas.openxmlformats.org/presentationml/2006/main">
   <p:cSld>
     <p:spTree>
@@ -12281,359 +12637,6 @@
 </p:sld>
 </file>
 
-<file path=ppt/slides/slide15.xml><?xml version="1.0" encoding="utf-8"?>
-<p:sld xmlns:a="http://schemas.openxmlformats.org/drawingml/2006/main" xmlns:r="http://schemas.openxmlformats.org/officeDocument/2006/relationships" xmlns:p="http://schemas.openxmlformats.org/presentationml/2006/main">
-  <p:cSld>
-    <p:spTree>
-      <p:nvGrpSpPr>
-        <p:cNvPr id="1" name=""/>
-        <p:cNvGrpSpPr/>
-        <p:nvPr/>
-      </p:nvGrpSpPr>
-      <p:grpSpPr>
-        <a:xfrm>
-          <a:off x="0" y="0"/>
-          <a:ext cx="0" cy="0"/>
-          <a:chOff x="0" y="0"/>
-          <a:chExt cx="0" cy="0"/>
-        </a:xfrm>
-      </p:grpSpPr>
-      <p:sp>
-        <p:nvSpPr>
-          <p:cNvPr id="4" name="Title 3"/>
-          <p:cNvSpPr>
-            <a:spLocks noGrp="1"/>
-          </p:cNvSpPr>
-          <p:nvPr>
-            <p:ph type="title"/>
-          </p:nvPr>
-        </p:nvSpPr>
-        <p:spPr/>
-        <p:txBody>
-          <a:bodyPr/>
-          <a:lstStyle/>
-          <a:p>
-            <a:r>
-              <a:rPr lang="en-US" dirty="0" smtClean="0"/>
-              <a:t>Demo – Hello SLAB</a:t>
-            </a:r>
-            <a:endParaRPr lang="en-US" dirty="0"/>
-          </a:p>
-        </p:txBody>
-      </p:sp>
-      <p:sp>
-        <p:nvSpPr>
-          <p:cNvPr id="5" name="Text Placeholder 4"/>
-          <p:cNvSpPr>
-            <a:spLocks noGrp="1"/>
-          </p:cNvSpPr>
-          <p:nvPr>
-            <p:ph type="body" sz="quarter" idx="12"/>
-          </p:nvPr>
-        </p:nvSpPr>
-        <p:spPr/>
-        <p:txBody>
-          <a:bodyPr/>
-          <a:lstStyle/>
-          <a:p>
-            <a:endParaRPr lang="en-US" dirty="0"/>
-          </a:p>
-        </p:txBody>
-      </p:sp>
-    </p:spTree>
-    <p:extLst>
-      <p:ext uri="{BB962C8B-B14F-4D97-AF65-F5344CB8AC3E}">
-        <p14:creationId xmlns:p14="http://schemas.microsoft.com/office/powerpoint/2010/main" val="4211053411"/>
-      </p:ext>
-    </p:extLst>
-  </p:cSld>
-  <p:clrMapOvr>
-    <a:masterClrMapping/>
-  </p:clrMapOvr>
-  <mc:AlternateContent xmlns:mc="http://schemas.openxmlformats.org/markup-compatibility/2006">
-    <mc:Choice xmlns:p14="http://schemas.microsoft.com/office/powerpoint/2010/main" Requires="p14">
-      <p:transition spd="slow" p14:dur="3400">
-        <p14:reveal/>
-      </p:transition>
-    </mc:Choice>
-    <mc:Fallback>
-      <p:transition spd="slow">
-        <p:fade/>
-      </p:transition>
-    </mc:Fallback>
-  </mc:AlternateContent>
-</p:sld>
-</file>
-
-<file path=ppt/slides/slide16.xml><?xml version="1.0" encoding="utf-8"?>
-<p:sld xmlns:a="http://schemas.openxmlformats.org/drawingml/2006/main" xmlns:r="http://schemas.openxmlformats.org/officeDocument/2006/relationships" xmlns:p="http://schemas.openxmlformats.org/presentationml/2006/main">
-  <p:cSld>
-    <p:spTree>
-      <p:nvGrpSpPr>
-        <p:cNvPr id="1" name=""/>
-        <p:cNvGrpSpPr/>
-        <p:nvPr/>
-      </p:nvGrpSpPr>
-      <p:grpSpPr>
-        <a:xfrm>
-          <a:off x="0" y="0"/>
-          <a:ext cx="0" cy="0"/>
-          <a:chOff x="0" y="0"/>
-          <a:chExt cx="0" cy="0"/>
-        </a:xfrm>
-      </p:grpSpPr>
-      <p:sp>
-        <p:nvSpPr>
-          <p:cNvPr id="5" name="Text Placeholder 4"/>
-          <p:cNvSpPr>
-            <a:spLocks noGrp="1"/>
-          </p:cNvSpPr>
-          <p:nvPr>
-            <p:ph type="body" sz="quarter" idx="10"/>
-          </p:nvPr>
-        </p:nvSpPr>
-        <p:spPr>
-          <a:xfrm>
-            <a:off x="274638" y="1212850"/>
-            <a:ext cx="11887200" cy="3447098"/>
-          </a:xfrm>
-        </p:spPr>
-        <p:txBody>
-          <a:bodyPr/>
-          <a:lstStyle/>
-          <a:p>
-            <a:r>
-              <a:rPr lang="en-US" dirty="0" smtClean="0"/>
-              <a:t>How to write an event from your app</a:t>
-            </a:r>
-          </a:p>
-          <a:p>
-            <a:r>
-              <a:rPr lang="en-US" dirty="0" smtClean="0"/>
-              <a:t>How to write an event from the </a:t>
-            </a:r>
-            <a:r>
-              <a:rPr lang="en-US" dirty="0" err="1" smtClean="0"/>
-              <a:t>global.asax</a:t>
-            </a:r>
-            <a:endParaRPr lang="en-US" dirty="0" smtClean="0"/>
-          </a:p>
-          <a:p>
-            <a:r>
-              <a:rPr lang="en-US" dirty="0" smtClean="0"/>
-              <a:t>What the event source looks like</a:t>
-            </a:r>
-          </a:p>
-          <a:p>
-            <a:r>
-              <a:rPr lang="en-US" dirty="0" smtClean="0"/>
-              <a:t>Attaching listeners in code</a:t>
-            </a:r>
-          </a:p>
-          <a:p>
-            <a:endParaRPr lang="en-US" dirty="0"/>
-          </a:p>
-        </p:txBody>
-      </p:sp>
-      <p:sp>
-        <p:nvSpPr>
-          <p:cNvPr id="4" name="Title 3"/>
-          <p:cNvSpPr>
-            <a:spLocks noGrp="1"/>
-          </p:cNvSpPr>
-          <p:nvPr>
-            <p:ph type="title"/>
-          </p:nvPr>
-        </p:nvSpPr>
-        <p:spPr/>
-        <p:txBody>
-          <a:bodyPr/>
-          <a:lstStyle/>
-          <a:p>
-            <a:r>
-              <a:rPr lang="en-US" dirty="0"/>
-              <a:t>Hello SLAB</a:t>
-            </a:r>
-          </a:p>
-        </p:txBody>
-      </p:sp>
-    </p:spTree>
-    <p:extLst>
-      <p:ext uri="{BB962C8B-B14F-4D97-AF65-F5344CB8AC3E}">
-        <p14:creationId xmlns:p14="http://schemas.microsoft.com/office/powerpoint/2010/main" val="1457870831"/>
-      </p:ext>
-    </p:extLst>
-  </p:cSld>
-  <p:clrMapOvr>
-    <a:masterClrMapping/>
-  </p:clrMapOvr>
-  <p:transition>
-    <p:fade/>
-  </p:transition>
-</p:sld>
-</file>
-
-<file path=ppt/slides/slide17.xml><?xml version="1.0" encoding="utf-8"?>
-<p:sld xmlns:a="http://schemas.openxmlformats.org/drawingml/2006/main" xmlns:r="http://schemas.openxmlformats.org/officeDocument/2006/relationships" xmlns:p="http://schemas.openxmlformats.org/presentationml/2006/main">
-  <p:cSld>
-    <p:spTree>
-      <p:nvGrpSpPr>
-        <p:cNvPr id="1" name=""/>
-        <p:cNvGrpSpPr/>
-        <p:nvPr/>
-      </p:nvGrpSpPr>
-      <p:grpSpPr>
-        <a:xfrm>
-          <a:off x="0" y="0"/>
-          <a:ext cx="0" cy="0"/>
-          <a:chOff x="0" y="0"/>
-          <a:chExt cx="0" cy="0"/>
-        </a:xfrm>
-      </p:grpSpPr>
-      <p:sp>
-        <p:nvSpPr>
-          <p:cNvPr id="2" name="Text Placeholder 1"/>
-          <p:cNvSpPr>
-            <a:spLocks noGrp="1"/>
-          </p:cNvSpPr>
-          <p:nvPr>
-            <p:ph type="body" sz="quarter" idx="10"/>
-          </p:nvPr>
-        </p:nvSpPr>
-        <p:spPr>
-          <a:xfrm>
-            <a:off x="274638" y="1212850"/>
-            <a:ext cx="11887200" cy="4419671"/>
-          </a:xfrm>
-        </p:spPr>
-        <p:txBody>
-          <a:bodyPr/>
-          <a:lstStyle/>
-          <a:p>
-            <a:r>
-              <a:rPr lang="en-US" sz="3200" dirty="0"/>
-              <a:t>Several sinks/destinations:</a:t>
-            </a:r>
-          </a:p>
-          <a:p>
-            <a:pPr lvl="1"/>
-            <a:r>
-              <a:rPr lang="en-US" dirty="0"/>
-              <a:t>Windows Azure Table.</a:t>
-            </a:r>
-          </a:p>
-          <a:p>
-            <a:pPr lvl="1"/>
-            <a:r>
-              <a:rPr lang="en-US" dirty="0"/>
-              <a:t>SQL Database.</a:t>
-            </a:r>
-          </a:p>
-          <a:p>
-            <a:pPr lvl="1"/>
-            <a:r>
-              <a:rPr lang="en-US" dirty="0"/>
-              <a:t>Flat file.</a:t>
-            </a:r>
-          </a:p>
-          <a:p>
-            <a:pPr lvl="1"/>
-            <a:r>
-              <a:rPr lang="en-US" dirty="0"/>
-              <a:t>Rolling flat file.</a:t>
-            </a:r>
-          </a:p>
-          <a:p>
-            <a:pPr lvl="1"/>
-            <a:r>
-              <a:rPr lang="en-US" dirty="0"/>
-              <a:t>Console.</a:t>
-            </a:r>
-          </a:p>
-          <a:p>
-            <a:r>
-              <a:rPr lang="en-US" sz="3200" dirty="0"/>
-              <a:t>Formatters (for text-based sinks):</a:t>
-            </a:r>
-          </a:p>
-          <a:p>
-            <a:pPr lvl="1"/>
-            <a:r>
-              <a:rPr lang="en-US" dirty="0"/>
-              <a:t>JSON.</a:t>
-            </a:r>
-          </a:p>
-          <a:p>
-            <a:pPr lvl="1"/>
-            <a:r>
-              <a:rPr lang="en-US" dirty="0"/>
-              <a:t>XML.</a:t>
-            </a:r>
-          </a:p>
-          <a:p>
-            <a:pPr lvl="1"/>
-            <a:r>
-              <a:rPr lang="en-US" dirty="0"/>
-              <a:t>Natural (plain-text</a:t>
-            </a:r>
-            <a:r>
-              <a:rPr lang="en-US" dirty="0" smtClean="0"/>
-              <a:t>).</a:t>
-            </a:r>
-            <a:endParaRPr lang="en-US" dirty="0"/>
-          </a:p>
-        </p:txBody>
-      </p:sp>
-      <p:sp>
-        <p:nvSpPr>
-          <p:cNvPr id="3" name="Title 2"/>
-          <p:cNvSpPr>
-            <a:spLocks noGrp="1"/>
-          </p:cNvSpPr>
-          <p:nvPr>
-            <p:ph type="title"/>
-          </p:nvPr>
-        </p:nvSpPr>
-        <p:spPr/>
-        <p:txBody>
-          <a:bodyPr/>
-          <a:lstStyle/>
-          <a:p>
-            <a:r>
-              <a:rPr lang="en-US" dirty="0"/>
-              <a:t>Built in Event </a:t>
-            </a:r>
-            <a:r>
-              <a:rPr lang="en-US" dirty="0" smtClean="0"/>
-              <a:t>Sinks &amp; Formatters</a:t>
-            </a:r>
-            <a:r>
-              <a:rPr lang="en-US" dirty="0"/>
-              <a:t/>
-            </a:r>
-            <a:br>
-              <a:rPr lang="en-US" dirty="0"/>
-            </a:br>
-            <a:endParaRPr lang="en-US" dirty="0"/>
-          </a:p>
-        </p:txBody>
-      </p:sp>
-    </p:spTree>
-    <p:extLst>
-      <p:ext uri="{BB962C8B-B14F-4D97-AF65-F5344CB8AC3E}">
-        <p14:creationId xmlns:p14="http://schemas.microsoft.com/office/powerpoint/2010/main" val="3335199891"/>
-      </p:ext>
-    </p:extLst>
-  </p:cSld>
-  <p:clrMapOvr>
-    <a:masterClrMapping/>
-  </p:clrMapOvr>
-  <p:transition>
-    <p:fade/>
-  </p:transition>
-</p:sld>
-</file>
-
 <file path=ppt/slides/slide18.xml><?xml version="1.0" encoding="utf-8"?>
 <p:sld xmlns:a="http://schemas.openxmlformats.org/drawingml/2006/main" xmlns:r="http://schemas.openxmlformats.org/officeDocument/2006/relationships" xmlns:p="http://schemas.openxmlformats.org/presentationml/2006/main">
   <p:cSld>
@@ -12668,7 +12671,7 @@
           <a:p>
             <a:r>
               <a:rPr lang="en-US" dirty="0" smtClean="0"/>
-              <a:t>Demo – SLAB Validation</a:t>
+              <a:t>Demo – Out of Process</a:t>
             </a:r>
             <a:endParaRPr lang="en-US" dirty="0"/>
           </a:p>
@@ -12696,7 +12699,7 @@
     </p:spTree>
     <p:extLst>
       <p:ext uri="{BB962C8B-B14F-4D97-AF65-F5344CB8AC3E}">
-        <p14:creationId xmlns:p14="http://schemas.microsoft.com/office/powerpoint/2010/main" val="2066904573"/>
+        <p14:creationId xmlns:p14="http://schemas.microsoft.com/office/powerpoint/2010/main" val="506074466"/>
       </p:ext>
     </p:extLst>
   </p:cSld>
@@ -12748,7 +12751,7 @@
         <p:spPr>
           <a:xfrm>
             <a:off x="274638" y="1212850"/>
-            <a:ext cx="11887200" cy="2228302"/>
+            <a:ext cx="11887200" cy="2634567"/>
           </a:xfrm>
         </p:spPr>
         <p:txBody>
@@ -12771,8 +12774,20 @@
             <a:pPr lvl="1"/>
             <a:r>
               <a:rPr lang="en-US" dirty="0" smtClean="0"/>
-              <a:t>Argument order</a:t>
-            </a:r>
+              <a:t>Argument </a:t>
+            </a:r>
+            <a:r>
+              <a:rPr lang="en-US" dirty="0" smtClean="0"/>
+              <a:t>order</a:t>
+            </a:r>
+          </a:p>
+          <a:p>
+            <a:pPr lvl="1"/>
+            <a:r>
+              <a:rPr lang="en-US" dirty="0" smtClean="0"/>
+              <a:t>Methods that take more then just simple types</a:t>
+            </a:r>
+            <a:endParaRPr lang="en-US" dirty="0" smtClean="0"/>
           </a:p>
           <a:p>
             <a:endParaRPr lang="en-US" dirty="0"/>
@@ -13211,103 +13226,7 @@
       </p:grpSpPr>
       <p:sp>
         <p:nvSpPr>
-          <p:cNvPr id="2" name="Text Placeholder 1"/>
-          <p:cNvSpPr>
-            <a:spLocks noGrp="1"/>
-          </p:cNvSpPr>
-          <p:nvPr>
-            <p:ph type="body" sz="quarter" idx="10"/>
-          </p:nvPr>
-        </p:nvSpPr>
-        <p:spPr>
-          <a:xfrm>
-            <a:off x="274638" y="1212850"/>
-            <a:ext cx="11887200" cy="4801314"/>
-          </a:xfrm>
-        </p:spPr>
-        <p:txBody>
-          <a:bodyPr/>
-          <a:lstStyle/>
-          <a:p>
-            <a:r>
-              <a:rPr lang="en-US" dirty="0" smtClean="0"/>
-              <a:t>Writing </a:t>
-            </a:r>
-            <a:r>
-              <a:rPr lang="en-US" dirty="0"/>
-              <a:t>Complex </a:t>
-            </a:r>
-            <a:r>
-              <a:rPr lang="en-US" dirty="0" smtClean="0"/>
-              <a:t>types </a:t>
-            </a:r>
-          </a:p>
-          <a:p>
-            <a:pPr lvl="1"/>
-            <a:r>
-              <a:rPr lang="en-US" dirty="0" smtClean="0"/>
-              <a:t>Write a helper method that strips the object for logging</a:t>
-            </a:r>
-          </a:p>
-          <a:p>
-            <a:r>
-              <a:rPr lang="en-US" dirty="0" smtClean="0"/>
-              <a:t>Keywords</a:t>
-            </a:r>
-          </a:p>
-          <a:p>
-            <a:pPr lvl="1"/>
-            <a:r>
-              <a:rPr lang="en-US" dirty="0" smtClean="0"/>
-              <a:t>Allow technique to filter what events get written to the log</a:t>
-            </a:r>
-          </a:p>
-          <a:p>
-            <a:pPr lvl="1"/>
-            <a:r>
-              <a:rPr lang="en-US" dirty="0" smtClean="0"/>
-              <a:t>Makes searching logs easier</a:t>
-            </a:r>
-          </a:p>
-          <a:p>
-            <a:r>
-              <a:rPr lang="en-US" dirty="0" smtClean="0"/>
-              <a:t>Tasks &amp; </a:t>
-            </a:r>
-            <a:r>
-              <a:rPr lang="en-US" dirty="0" err="1" smtClean="0"/>
-              <a:t>OpCodes</a:t>
-            </a:r>
-            <a:r>
-              <a:rPr lang="en-US" dirty="0" smtClean="0"/>
-              <a:t>	</a:t>
-            </a:r>
-          </a:p>
-          <a:p>
-            <a:pPr lvl="1"/>
-            <a:r>
-              <a:rPr lang="en-US" dirty="0" smtClean="0"/>
-              <a:t>Allows for additional metadata to be added to the log</a:t>
-            </a:r>
-          </a:p>
-          <a:p>
-            <a:r>
-              <a:rPr lang="en-US" dirty="0" smtClean="0"/>
-              <a:t>Version</a:t>
-            </a:r>
-          </a:p>
-          <a:p>
-            <a:pPr lvl="1"/>
-            <a:r>
-              <a:rPr lang="en-US" dirty="0" smtClean="0"/>
-              <a:t>Flags logged events making resilient to schema changes</a:t>
-            </a:r>
-          </a:p>
-        </p:txBody>
-      </p:sp>
-      <p:sp>
-        <p:nvSpPr>
-          <p:cNvPr id="3" name="Title 2"/>
+          <p:cNvPr id="4" name="Title 3"/>
           <p:cNvSpPr>
             <a:spLocks noGrp="1"/>
           </p:cNvSpPr>
@@ -13321,33 +13240,54 @@
           <a:lstStyle/>
           <a:p>
             <a:r>
-              <a:rPr lang="en-US" dirty="0"/>
-              <a:t>Advanced </a:t>
-            </a:r>
-            <a:r>
-              <a:rPr lang="en-US" dirty="0" err="1"/>
-              <a:t>EventSource</a:t>
-            </a:r>
-            <a:r>
-              <a:rPr lang="en-US" dirty="0"/>
-              <a:t> </a:t>
-            </a:r>
+              <a:rPr lang="en-US" dirty="0" smtClean="0"/>
+              <a:t>Demo – SLAB Validation</a:t>
+            </a:r>
+            <a:endParaRPr lang="en-US" dirty="0"/>
+          </a:p>
+        </p:txBody>
+      </p:sp>
+      <p:sp>
+        <p:nvSpPr>
+          <p:cNvPr id="5" name="Text Placeholder 4"/>
+          <p:cNvSpPr>
+            <a:spLocks noGrp="1"/>
+          </p:cNvSpPr>
+          <p:nvPr>
+            <p:ph type="body" sz="quarter" idx="12"/>
+          </p:nvPr>
+        </p:nvSpPr>
+        <p:spPr/>
+        <p:txBody>
+          <a:bodyPr/>
+          <a:lstStyle/>
+          <a:p>
+            <a:endParaRPr lang="en-US"/>
           </a:p>
         </p:txBody>
       </p:sp>
     </p:spTree>
     <p:extLst>
       <p:ext uri="{BB962C8B-B14F-4D97-AF65-F5344CB8AC3E}">
-        <p14:creationId xmlns:p14="http://schemas.microsoft.com/office/powerpoint/2010/main" val="3669670597"/>
+        <p14:creationId xmlns:p14="http://schemas.microsoft.com/office/powerpoint/2010/main" val="2066904573"/>
       </p:ext>
     </p:extLst>
   </p:cSld>
   <p:clrMapOvr>
     <a:masterClrMapping/>
   </p:clrMapOvr>
-  <p:transition>
-    <p:fade/>
-  </p:transition>
+  <mc:AlternateContent xmlns:mc="http://schemas.openxmlformats.org/markup-compatibility/2006" xmlns:p14="http://schemas.microsoft.com/office/powerpoint/2010/main">
+    <mc:Choice Requires="p14">
+      <p:transition spd="slow" p14:dur="3400">
+        <p14:reveal/>
+      </p:transition>
+    </mc:Choice>
+    <mc:Fallback xmlns="">
+      <p:transition spd="slow">
+        <p:fade/>
+      </p:transition>
+    </mc:Fallback>
+  </mc:AlternateContent>
 </p:sld>
 </file>
 
@@ -13381,7 +13321,7 @@
         <p:spPr>
           <a:xfrm>
             <a:off x="274638" y="1212850"/>
-            <a:ext cx="11887200" cy="3336298"/>
+            <a:ext cx="11887200" cy="5133713"/>
           </a:xfrm>
         </p:spPr>
         <p:txBody>
@@ -13390,48 +13330,87 @@
           <a:p>
             <a:r>
               <a:rPr lang="en-US" dirty="0" smtClean="0"/>
-              <a:t>Consume ETW events via external tools</a:t>
-            </a:r>
-          </a:p>
-          <a:p>
+              <a:t>Writing </a:t>
+            </a:r>
+            <a:r>
+              <a:rPr lang="en-US" dirty="0"/>
+              <a:t>Complex </a:t>
+            </a:r>
+            <a:r>
+              <a:rPr lang="en-US" dirty="0" smtClean="0"/>
+              <a:t>types </a:t>
+            </a:r>
+          </a:p>
+          <a:p>
+            <a:pPr lvl="1"/>
+            <a:r>
+              <a:rPr lang="en-US" dirty="0" smtClean="0"/>
+              <a:t>Write a helper method that strips the object for </a:t>
+            </a:r>
+            <a:r>
+              <a:rPr lang="en-US" dirty="0" smtClean="0"/>
+              <a:t>logging, add the </a:t>
+            </a:r>
             <a:r>
               <a:rPr lang="en-US" dirty="0" err="1" smtClean="0"/>
-              <a:t>PerfView</a:t>
+              <a:t>NonEvent</a:t>
             </a:r>
             <a:r>
               <a:rPr lang="en-US" dirty="0" smtClean="0"/>
-              <a:t> </a:t>
-            </a:r>
-            <a:r>
-              <a:rPr lang="en-US" dirty="0"/>
-              <a:t>is a performance-analysis tool that helps isolate CPU- and memory-related performance issues. </a:t>
+              <a:t> Attribute</a:t>
+            </a:r>
+            <a:endParaRPr lang="en-US" dirty="0" smtClean="0"/>
+          </a:p>
+          <a:p>
+            <a:r>
+              <a:rPr lang="en-US" dirty="0" smtClean="0"/>
+              <a:t>Keywords</a:t>
             </a:r>
           </a:p>
           <a:p>
             <a:pPr lvl="1"/>
             <a:r>
-              <a:rPr lang="en-US" dirty="0" smtClean="0">
-                <a:hlinkClick r:id="rId2"/>
-              </a:rPr>
-              <a:t>http</a:t>
-            </a:r>
-            <a:r>
-              <a:rPr lang="en-US" dirty="0">
-                <a:hlinkClick r:id="rId2"/>
-              </a:rPr>
-              <a:t>://</a:t>
-            </a:r>
-            <a:r>
-              <a:rPr lang="en-US" dirty="0" smtClean="0">
-                <a:hlinkClick r:id="rId2"/>
-              </a:rPr>
-              <a:t>www.microsoft.com/en-us/download/details.aspx?id=28567</a:t>
+              <a:rPr lang="en-US" dirty="0" smtClean="0"/>
+              <a:t>Allow technique to filter what events get written to the log</a:t>
+            </a:r>
+          </a:p>
+          <a:p>
+            <a:pPr lvl="1"/>
+            <a:r>
+              <a:rPr lang="en-US" dirty="0" smtClean="0"/>
+              <a:t>Makes searching logs easier</a:t>
+            </a:r>
+          </a:p>
+          <a:p>
+            <a:r>
+              <a:rPr lang="en-US" dirty="0" smtClean="0"/>
+              <a:t>Tasks &amp; </a:t>
+            </a:r>
+            <a:r>
+              <a:rPr lang="en-US" dirty="0" err="1" smtClean="0"/>
+              <a:t>OpCodes</a:t>
             </a:r>
             <a:endParaRPr lang="en-US" dirty="0" smtClean="0"/>
           </a:p>
           <a:p>
             <a:pPr lvl="1"/>
-            <a:endParaRPr lang="en-US" dirty="0"/>
+            <a:r>
+              <a:rPr lang="en-US" dirty="0" smtClean="0"/>
+              <a:t>Allows for additional metadata to be added to the log</a:t>
+            </a:r>
+          </a:p>
+          <a:p>
+            <a:r>
+              <a:rPr lang="en-US" dirty="0" smtClean="0"/>
+              <a:t>Version</a:t>
+            </a:r>
+          </a:p>
+          <a:p>
+            <a:pPr lvl="1"/>
+            <a:r>
+              <a:rPr lang="en-US" dirty="0" smtClean="0"/>
+              <a:t>Flags logged events making resilient to schema changes</a:t>
+            </a:r>
           </a:p>
         </p:txBody>
       </p:sp>
@@ -13451,17 +13430,24 @@
           <a:lstStyle/>
           <a:p>
             <a:r>
-              <a:rPr lang="en-US" dirty="0" err="1" smtClean="0"/>
-              <a:t>PerfView</a:t>
-            </a:r>
-            <a:endParaRPr lang="en-US" dirty="0"/>
+              <a:rPr lang="en-US" dirty="0"/>
+              <a:t>Advanced </a:t>
+            </a:r>
+            <a:r>
+              <a:rPr lang="en-US" dirty="0" err="1"/>
+              <a:t>EventSource</a:t>
+            </a:r>
+            <a:r>
+              <a:rPr lang="en-US" dirty="0"/>
+              <a:t> </a:t>
+            </a:r>
           </a:p>
         </p:txBody>
       </p:sp>
     </p:spTree>
     <p:extLst>
       <p:ext uri="{BB962C8B-B14F-4D97-AF65-F5344CB8AC3E}">
-        <p14:creationId xmlns:p14="http://schemas.microsoft.com/office/powerpoint/2010/main" val="3033891860"/>
+        <p14:creationId xmlns:p14="http://schemas.microsoft.com/office/powerpoint/2010/main" val="3669670597"/>
       </p:ext>
     </p:extLst>
   </p:cSld>
@@ -13504,57 +13490,52 @@
         <p:spPr>
           <a:xfrm>
             <a:off x="274638" y="1212850"/>
-            <a:ext cx="11887200" cy="3200876"/>
+            <a:ext cx="11887200" cy="2769989"/>
           </a:xfrm>
         </p:spPr>
         <p:txBody>
           <a:bodyPr/>
           <a:lstStyle/>
           <a:p>
-            <a:pPr marL="742950" indent="-742950">
-              <a:buFont typeface="+mj-lt"/>
-              <a:buAutoNum type="arabicPeriod"/>
-            </a:pPr>
             <a:r>
               <a:rPr lang="en-US" dirty="0" smtClean="0"/>
-              <a:t>Create an </a:t>
+              <a:t>Don’t write on disabled events</a:t>
+            </a:r>
+          </a:p>
+          <a:p>
+            <a:r>
+              <a:rPr lang="en-US" dirty="0" smtClean="0"/>
+              <a:t>Write using non – “</a:t>
             </a:r>
             <a:r>
               <a:rPr lang="en-US" dirty="0" err="1" smtClean="0"/>
-              <a:t>EventSource</a:t>
+              <a:t>Params</a:t>
             </a:r>
             <a:r>
               <a:rPr lang="en-US" dirty="0" smtClean="0"/>
-              <a:t> class to describe what you want to log</a:t>
-            </a:r>
-          </a:p>
-          <a:p>
-            <a:pPr marL="742950" indent="-742950">
-              <a:buFont typeface="+mj-lt"/>
-              <a:buAutoNum type="arabicPeriod"/>
-            </a:pPr>
+              <a:t>” overload</a:t>
+            </a:r>
+          </a:p>
+          <a:p>
             <a:r>
               <a:rPr lang="en-US" dirty="0" smtClean="0"/>
-              <a:t>Call your </a:t>
+              <a:t>Pass </a:t>
             </a:r>
             <a:r>
               <a:rPr lang="en-US" dirty="0" err="1" smtClean="0"/>
-              <a:t>EventSource</a:t>
+              <a:t>enums</a:t>
             </a:r>
             <a:r>
               <a:rPr lang="en-US" dirty="0" smtClean="0"/>
-              <a:t> class from your code</a:t>
-            </a:r>
-          </a:p>
-          <a:p>
-            <a:pPr marL="742950" indent="-742950">
-              <a:buFont typeface="+mj-lt"/>
-              <a:buAutoNum type="arabicPeriod"/>
-            </a:pPr>
-            <a:r>
-              <a:rPr lang="en-US" dirty="0" smtClean="0"/>
-              <a:t>If “In Process” - Add an Event listener to capture your messages to the appropriate Event Sink</a:t>
-            </a:r>
+              <a:t> as </a:t>
+            </a:r>
+            <a:r>
+              <a:rPr lang="en-US" dirty="0" err="1" smtClean="0"/>
+              <a:t>ints</a:t>
+            </a:r>
+            <a:endParaRPr lang="en-US" dirty="0" smtClean="0"/>
+          </a:p>
+          <a:p>
             <a:endParaRPr lang="en-US" dirty="0"/>
           </a:p>
         </p:txBody>
@@ -13575,8 +13556,12 @@
           <a:lstStyle/>
           <a:p>
             <a:r>
+              <a:rPr lang="en-US" dirty="0" err="1" smtClean="0"/>
+              <a:t>EventSource</a:t>
+            </a:r>
+            <a:r>
               <a:rPr lang="en-US" dirty="0" smtClean="0"/>
-              <a:t>Using SLAB in 3 easy steps</a:t>
+              <a:t> Performance</a:t>
             </a:r>
             <a:endParaRPr lang="en-US" dirty="0"/>
           </a:p>
@@ -13585,7 +13570,7 @@
     </p:spTree>
     <p:extLst>
       <p:ext uri="{BB962C8B-B14F-4D97-AF65-F5344CB8AC3E}">
-        <p14:creationId xmlns:p14="http://schemas.microsoft.com/office/powerpoint/2010/main" val="731826054"/>
+        <p14:creationId xmlns:p14="http://schemas.microsoft.com/office/powerpoint/2010/main" val="443188558"/>
       </p:ext>
     </p:extLst>
   </p:cSld>
@@ -13628,7 +13613,7 @@
         <p:spPr>
           <a:xfrm>
             <a:off x="274638" y="1212850"/>
-            <a:ext cx="11887200" cy="5761577"/>
+            <a:ext cx="11887200" cy="3336298"/>
           </a:xfrm>
         </p:spPr>
         <p:txBody>
@@ -13637,112 +13622,44 @@
           <a:p>
             <a:r>
               <a:rPr lang="en-US" dirty="0" smtClean="0"/>
-              <a:t>SLAB </a:t>
-            </a:r>
+              <a:t>Consume ETW events via external tools</a:t>
+            </a:r>
+          </a:p>
+          <a:p>
             <a:r>
               <a:rPr lang="en-US" dirty="0" err="1" smtClean="0"/>
-              <a:t>CodePlex</a:t>
+              <a:t>PerfView</a:t>
             </a:r>
             <a:r>
               <a:rPr lang="en-US" dirty="0" smtClean="0"/>
-              <a:t> site</a:t>
+              <a:t> </a:t>
+            </a:r>
+            <a:r>
+              <a:rPr lang="en-US" dirty="0"/>
+              <a:t>is a performance-analysis tool that helps isolate CPU- and memory-related performance issues. </a:t>
             </a:r>
           </a:p>
           <a:p>
             <a:pPr lvl="1"/>
+            <a:r>
+              <a:rPr lang="en-US" dirty="0" smtClean="0">
+                <a:hlinkClick r:id="rId2"/>
+              </a:rPr>
+              <a:t>http</a:t>
+            </a:r>
             <a:r>
               <a:rPr lang="en-US" dirty="0">
                 <a:hlinkClick r:id="rId2"/>
               </a:rPr>
-              <a:t>http://slab.codeplex.com</a:t>
+              <a:t>://</a:t>
             </a:r>
             <a:r>
               <a:rPr lang="en-US" dirty="0" smtClean="0">
                 <a:hlinkClick r:id="rId2"/>
               </a:rPr>
-              <a:t>/</a:t>
-            </a:r>
-            <a:r>
-              <a:rPr lang="en-US" dirty="0" smtClean="0"/>
-              <a:t> </a:t>
-            </a:r>
-            <a:endParaRPr lang="en-US" dirty="0"/>
-          </a:p>
-          <a:p>
-            <a:r>
-              <a:rPr lang="en-US" dirty="0" smtClean="0"/>
-              <a:t>Creating </a:t>
-            </a:r>
-            <a:r>
-              <a:rPr lang="en-US" dirty="0"/>
-              <a:t>Structured and Meaningful Logs with Semantic Logging </a:t>
+              <a:t>www.microsoft.com/en-us/download/details.aspx?id=28567</a:t>
             </a:r>
             <a:endParaRPr lang="en-US" dirty="0" smtClean="0"/>
-          </a:p>
-          <a:p>
-            <a:pPr lvl="1"/>
-            <a:r>
-              <a:rPr lang="en-US" dirty="0" smtClean="0"/>
-              <a:t>Julian Dominguez, Build 2013</a:t>
-            </a:r>
-          </a:p>
-          <a:p>
-            <a:pPr lvl="1"/>
-            <a:r>
-              <a:rPr lang="en-US" dirty="0" smtClean="0">
-                <a:hlinkClick r:id="rId3"/>
-              </a:rPr>
-              <a:t>http</a:t>
-            </a:r>
-            <a:r>
-              <a:rPr lang="en-US" dirty="0">
-                <a:hlinkClick r:id="rId3"/>
-              </a:rPr>
-              <a:t>://</a:t>
-            </a:r>
-            <a:r>
-              <a:rPr lang="en-US" dirty="0" smtClean="0">
-                <a:hlinkClick r:id="rId3"/>
-              </a:rPr>
-              <a:t>channel9.msdn.com/Events/Build/2013/3-336</a:t>
-            </a:r>
-            <a:endParaRPr lang="en-US" dirty="0" smtClean="0"/>
-          </a:p>
-          <a:p>
-            <a:r>
-              <a:rPr lang="en-US" dirty="0"/>
-              <a:t>Introducing Semantic </a:t>
-            </a:r>
-            <a:r>
-              <a:rPr lang="en-US" dirty="0" smtClean="0"/>
-              <a:t>Logging</a:t>
-            </a:r>
-          </a:p>
-          <a:p>
-            <a:pPr lvl="1"/>
-            <a:r>
-              <a:rPr lang="en-US" dirty="0" smtClean="0"/>
-              <a:t>Grigori Melnik</a:t>
-            </a:r>
-          </a:p>
-          <a:p>
-            <a:pPr lvl="1"/>
-            <a:r>
-              <a:rPr lang="en-US" dirty="0">
-                <a:hlinkClick r:id="rId4"/>
-              </a:rPr>
-              <a:t>http://</a:t>
-            </a:r>
-            <a:r>
-              <a:rPr lang="en-US" dirty="0" smtClean="0">
-                <a:hlinkClick r:id="rId4"/>
-              </a:rPr>
-              <a:t>channel9.msdn.com/posts/Introducing-Semantic-Logging</a:t>
-            </a:r>
-            <a:endParaRPr lang="en-US" dirty="0" smtClean="0"/>
-          </a:p>
-          <a:p>
-            <a:endParaRPr lang="en-US" dirty="0"/>
           </a:p>
           <a:p>
             <a:pPr lvl="1"/>
@@ -13766,8 +13683,8 @@
           <a:lstStyle/>
           <a:p>
             <a:r>
-              <a:rPr lang="en-US" dirty="0" smtClean="0"/>
-              <a:t>More Info</a:t>
+              <a:rPr lang="en-US" dirty="0" err="1" smtClean="0"/>
+              <a:t>PerfView</a:t>
             </a:r>
             <a:endParaRPr lang="en-US" dirty="0"/>
           </a:p>
@@ -13776,7 +13693,7 @@
     </p:spTree>
     <p:extLst>
       <p:ext uri="{BB962C8B-B14F-4D97-AF65-F5344CB8AC3E}">
-        <p14:creationId xmlns:p14="http://schemas.microsoft.com/office/powerpoint/2010/main" val="1416519834"/>
+        <p14:creationId xmlns:p14="http://schemas.microsoft.com/office/powerpoint/2010/main" val="3033891860"/>
       </p:ext>
     </p:extLst>
   </p:cSld>
@@ -13819,126 +13736,57 @@
         <p:spPr>
           <a:xfrm>
             <a:off x="274638" y="1212850"/>
-            <a:ext cx="11887200" cy="5410712"/>
+            <a:ext cx="11887200" cy="3200876"/>
           </a:xfrm>
         </p:spPr>
         <p:txBody>
           <a:bodyPr/>
           <a:lstStyle/>
           <a:p>
-            <a:r>
-              <a:rPr lang="en-US" dirty="0"/>
-              <a:t>Announcing the </a:t>
-            </a:r>
-            <a:r>
-              <a:rPr lang="en-US" dirty="0" err="1"/>
+            <a:pPr marL="742950" indent="-742950">
+              <a:buFont typeface="+mj-lt"/>
+              <a:buAutoNum type="arabicPeriod"/>
+            </a:pPr>
+            <a:r>
+              <a:rPr lang="en-US" dirty="0" smtClean="0"/>
+              <a:t>Create an </a:t>
+            </a:r>
+            <a:r>
+              <a:rPr lang="en-US" dirty="0" err="1" smtClean="0"/>
               <a:t>EventSource</a:t>
             </a:r>
             <a:r>
-              <a:rPr lang="en-US" dirty="0"/>
-              <a:t> </a:t>
-            </a:r>
-            <a:r>
-              <a:rPr lang="en-US" dirty="0" err="1"/>
-              <a:t>NuGet</a:t>
-            </a:r>
-            <a:r>
-              <a:rPr lang="en-US" dirty="0"/>
-              <a:t> Package – Write to the Windows Event </a:t>
-            </a:r>
-            <a:r>
               <a:rPr lang="en-US" dirty="0" smtClean="0"/>
-              <a:t>Log</a:t>
-            </a:r>
-          </a:p>
-          <a:p>
-            <a:pPr lvl="1"/>
-            <a:r>
-              <a:rPr lang="en-US" dirty="0" smtClean="0">
-                <a:hlinkClick r:id="rId2"/>
-              </a:rPr>
-              <a:t>http</a:t>
-            </a:r>
-            <a:r>
-              <a:rPr lang="en-US" dirty="0">
-                <a:hlinkClick r:id="rId2"/>
-              </a:rPr>
-              <a:t>://</a:t>
-            </a:r>
-            <a:r>
-              <a:rPr lang="en-US" dirty="0" smtClean="0">
-                <a:hlinkClick r:id="rId2"/>
-              </a:rPr>
-              <a:t>blogs.msdn.com/b/dotnet/archive/2013/08/09/announcing-the-eventsource-nuget-package-write-to-the-windows-event-log.aspx</a:t>
-            </a:r>
-            <a:endParaRPr lang="en-US" dirty="0" smtClean="0"/>
-          </a:p>
-          <a:p>
-            <a:r>
-              <a:rPr lang="en-US" dirty="0"/>
-              <a:t>SLAB - Reactive Event Sourcing </a:t>
-            </a:r>
-            <a:endParaRPr lang="en-US" dirty="0" smtClean="0"/>
-          </a:p>
-          <a:p>
-            <a:pPr lvl="1"/>
-            <a:r>
-              <a:rPr lang="en-US" dirty="0">
-                <a:hlinkClick r:id="rId3"/>
-              </a:rPr>
-              <a:t>http://</a:t>
-            </a:r>
-            <a:r>
-              <a:rPr lang="en-US" dirty="0" smtClean="0">
-                <a:hlinkClick r:id="rId3"/>
-              </a:rPr>
-              <a:t>www.shujaat.net/2013/08/slab-reactive-event-sourcing.html</a:t>
-            </a:r>
-            <a:endParaRPr lang="en-US" dirty="0"/>
-          </a:p>
-          <a:p>
-            <a:pPr lvl="1"/>
-            <a:r>
-              <a:rPr lang="en-US" dirty="0"/>
-              <a:t>Event listener is </a:t>
-            </a:r>
-            <a:r>
-              <a:rPr lang="en-US" dirty="0" err="1"/>
-              <a:t>IObservable</a:t>
-            </a:r>
-            <a:r>
-              <a:rPr lang="en-US" dirty="0"/>
-              <a:t>.</a:t>
-            </a:r>
-          </a:p>
-          <a:p>
-            <a:pPr lvl="1"/>
-            <a:r>
-              <a:rPr lang="en-US" dirty="0"/>
-              <a:t>Event sinks are </a:t>
-            </a:r>
-            <a:r>
-              <a:rPr lang="en-US" dirty="0" err="1"/>
-              <a:t>IObservers</a:t>
-            </a:r>
-            <a:r>
-              <a:rPr lang="en-US" dirty="0"/>
-              <a:t>.</a:t>
-            </a:r>
-          </a:p>
-          <a:p>
-            <a:pPr lvl="1"/>
-            <a:r>
-              <a:rPr lang="en-US" dirty="0"/>
-              <a:t>Can leverage Reactive Extensions (Rx) to filter, pre-process or transform the event stream before it’s persisted.</a:t>
-            </a:r>
-          </a:p>
-          <a:p>
-            <a:pPr lvl="2"/>
-            <a:endParaRPr lang="en-US" dirty="0" smtClean="0"/>
-          </a:p>
-          <a:p>
-            <a:pPr lvl="1"/>
+              <a:t> class to describe what you want to log</a:t>
+            </a:r>
+          </a:p>
+          <a:p>
+            <a:pPr marL="742950" indent="-742950">
+              <a:buFont typeface="+mj-lt"/>
+              <a:buAutoNum type="arabicPeriod"/>
+            </a:pPr>
+            <a:r>
+              <a:rPr lang="en-US" dirty="0" smtClean="0"/>
+              <a:t>Call your </a:t>
+            </a:r>
+            <a:r>
+              <a:rPr lang="en-US" dirty="0" err="1" smtClean="0"/>
+              <a:t>EventSource</a:t>
+            </a:r>
+            <a:r>
+              <a:rPr lang="en-US" dirty="0" smtClean="0"/>
+              <a:t> class from your code</a:t>
+            </a:r>
+          </a:p>
+          <a:p>
+            <a:pPr marL="742950" indent="-742950">
+              <a:buFont typeface="+mj-lt"/>
+              <a:buAutoNum type="arabicPeriod"/>
+            </a:pPr>
+            <a:r>
+              <a:rPr lang="en-US" dirty="0" smtClean="0"/>
+              <a:t>If “In Process” - Add an Event listener to capture your messages to the appropriate Event Sink</a:t>
+            </a:r>
             <a:endParaRPr lang="en-US" dirty="0"/>
           </a:p>
         </p:txBody>
@@ -13960,7 +13808,7 @@
           <a:p>
             <a:r>
               <a:rPr lang="en-US" dirty="0" smtClean="0"/>
-              <a:t>More Info</a:t>
+              <a:t>Using SLAB in 3 easy steps</a:t>
             </a:r>
             <a:endParaRPr lang="en-US" dirty="0"/>
           </a:p>
@@ -13969,7 +13817,7 @@
     </p:spTree>
     <p:extLst>
       <p:ext uri="{BB962C8B-B14F-4D97-AF65-F5344CB8AC3E}">
-        <p14:creationId xmlns:p14="http://schemas.microsoft.com/office/powerpoint/2010/main" val="1129073334"/>
+        <p14:creationId xmlns:p14="http://schemas.microsoft.com/office/powerpoint/2010/main" val="731826054"/>
       </p:ext>
     </p:extLst>
   </p:cSld>
@@ -14012,7 +13860,7 @@
         <p:spPr>
           <a:xfrm>
             <a:off x="274638" y="1212850"/>
-            <a:ext cx="11887200" cy="4789003"/>
+            <a:ext cx="11887200" cy="5761577"/>
           </a:xfrm>
         </p:spPr>
         <p:txBody>
@@ -14020,12 +13868,16 @@
           <a:lstStyle/>
           <a:p>
             <a:r>
-              <a:rPr lang="en-US" dirty="0"/>
-              <a:t>Semantic Logging Application Block (SLAB</a:t>
-            </a:r>
-            <a:r>
               <a:rPr lang="en-US" dirty="0" smtClean="0"/>
-              <a:t>)</a:t>
+              <a:t>SLAB </a:t>
+            </a:r>
+            <a:r>
+              <a:rPr lang="en-US" dirty="0" err="1" smtClean="0"/>
+              <a:t>CodePlex</a:t>
+            </a:r>
+            <a:r>
+              <a:rPr lang="en-US" dirty="0" smtClean="0"/>
+              <a:t> site</a:t>
             </a:r>
           </a:p>
           <a:p>
@@ -14034,7 +13886,7 @@
               <a:rPr lang="en-US" dirty="0">
                 <a:hlinkClick r:id="rId2"/>
               </a:rPr>
-              <a:t>http://convective.wordpress.com/2013/08/12/semantic-logging-application-block-slab</a:t>
+              <a:t>http://slab.codeplex.com</a:t>
             </a:r>
             <a:r>
               <a:rPr lang="en-US" dirty="0" smtClean="0">
@@ -14042,80 +13894,67 @@
               </a:rPr>
               <a:t>/</a:t>
             </a:r>
+            <a:r>
+              <a:rPr lang="en-US" dirty="0" smtClean="0"/>
+              <a:t> </a:t>
+            </a:r>
+            <a:endParaRPr lang="en-US" dirty="0"/>
+          </a:p>
+          <a:p>
+            <a:r>
+              <a:rPr lang="en-US" dirty="0" smtClean="0"/>
+              <a:t>Creating </a:t>
+            </a:r>
+            <a:r>
+              <a:rPr lang="en-US" dirty="0"/>
+              <a:t>Structured and Meaningful Logs with Semantic Logging </a:t>
+            </a:r>
             <a:endParaRPr lang="en-US" dirty="0" smtClean="0"/>
           </a:p>
           <a:p>
-            <a:r>
-              <a:rPr lang="en-US" dirty="0"/>
-              <a:t>Semantic Logging Application Block (SLAB) </a:t>
-            </a:r>
+            <a:pPr lvl="1"/>
             <a:r>
               <a:rPr lang="en-US" dirty="0" smtClean="0"/>
-              <a:t>1.1</a:t>
+              <a:t>Julian Dominguez, Build 2013</a:t>
             </a:r>
           </a:p>
           <a:p>
             <a:pPr lvl="1"/>
+            <a:r>
+              <a:rPr lang="en-US" dirty="0" smtClean="0">
+                <a:hlinkClick r:id="rId3"/>
+              </a:rPr>
+              <a:t>http</a:t>
+            </a:r>
             <a:r>
               <a:rPr lang="en-US" dirty="0">
                 <a:hlinkClick r:id="rId3"/>
               </a:rPr>
-              <a:t>https://</a:t>
+              <a:t>://</a:t>
             </a:r>
             <a:r>
               <a:rPr lang="en-US" dirty="0" smtClean="0">
                 <a:hlinkClick r:id="rId3"/>
               </a:rPr>
-              <a:t>slab.codeplex.com/wikipage?title=ActivityTracingAndSampling</a:t>
+              <a:t>channel9.msdn.com/Events/Build/2013/3-336</a:t>
+            </a:r>
+            <a:endParaRPr lang="en-US" dirty="0" smtClean="0"/>
+          </a:p>
+          <a:p>
+            <a:r>
+              <a:rPr lang="en-US" dirty="0"/>
+              <a:t>Introducing Semantic </a:t>
             </a:r>
             <a:r>
               <a:rPr lang="en-US" dirty="0" smtClean="0"/>
-              <a:t> </a:t>
+              <a:t>Logging</a:t>
             </a:r>
           </a:p>
           <a:p>
             <a:pPr lvl="1"/>
             <a:r>
               <a:rPr lang="en-US" dirty="0" smtClean="0"/>
-              <a:t>Adds support for </a:t>
-            </a:r>
-            <a:r>
-              <a:rPr lang="en-US" dirty="0" err="1" smtClean="0"/>
-              <a:t>ActivityId</a:t>
-            </a:r>
-            <a:r>
-              <a:rPr lang="en-US" dirty="0" smtClean="0"/>
-              <a:t> </a:t>
-            </a:r>
-            <a:r>
-              <a:rPr lang="en-US" dirty="0"/>
-              <a:t>and </a:t>
-            </a:r>
-            <a:r>
-              <a:rPr lang="en-US" dirty="0" err="1"/>
-              <a:t>RelatedActivityId</a:t>
-            </a:r>
-            <a:r>
-              <a:rPr lang="en-US" dirty="0"/>
-              <a:t> </a:t>
-            </a:r>
-            <a:r>
-              <a:rPr lang="en-US" dirty="0" smtClean="0"/>
-              <a:t>allowing you to </a:t>
-            </a:r>
-            <a:r>
-              <a:rPr lang="en-US" dirty="0"/>
-              <a:t>correlate events </a:t>
-            </a:r>
-            <a:r>
-              <a:rPr lang="en-US" dirty="0" smtClean="0"/>
-              <a:t>between separate log messages</a:t>
-            </a:r>
-          </a:p>
-          <a:p>
-            <a:r>
-              <a:rPr lang="en-US" dirty="0" smtClean="0"/>
-              <a:t>SLAB on MSDN</a:t>
+              <a:t>Grigori Melnik</a:t>
             </a:r>
           </a:p>
           <a:p>
@@ -14124,22 +13963,21 @@
               <a:rPr lang="en-US" dirty="0">
                 <a:hlinkClick r:id="rId4"/>
               </a:rPr>
-              <a:t>http://msdn.microsoft.com/en-us/library/dn440729(v=pandp.60).</a:t>
+              <a:t>http://</a:t>
             </a:r>
             <a:r>
               <a:rPr lang="en-US" dirty="0" smtClean="0">
                 <a:hlinkClick r:id="rId4"/>
               </a:rPr>
-              <a:t>aspx</a:t>
+              <a:t>channel9.msdn.com/posts/Introducing-Semantic-Logging</a:t>
             </a:r>
             <a:endParaRPr lang="en-US" dirty="0" smtClean="0"/>
           </a:p>
           <a:p>
+            <a:endParaRPr lang="en-US" dirty="0"/>
+          </a:p>
+          <a:p>
             <a:pPr lvl="1"/>
-            <a:r>
-              <a:rPr lang="en-US" dirty="0" smtClean="0"/>
-              <a:t>Sample Code and PDF book</a:t>
-            </a:r>
             <a:endParaRPr lang="en-US" dirty="0"/>
           </a:p>
         </p:txBody>
@@ -14170,7 +14008,7 @@
     </p:spTree>
     <p:extLst>
       <p:ext uri="{BB962C8B-B14F-4D97-AF65-F5344CB8AC3E}">
-        <p14:creationId xmlns:p14="http://schemas.microsoft.com/office/powerpoint/2010/main" val="3583086404"/>
+        <p14:creationId xmlns:p14="http://schemas.microsoft.com/office/powerpoint/2010/main" val="1416519834"/>
       </p:ext>
     </p:extLst>
   </p:cSld>
@@ -14213,7 +14051,7 @@
         <p:spPr>
           <a:xfrm>
             <a:off x="274638" y="1212850"/>
-            <a:ext cx="11887200" cy="3717941"/>
+            <a:ext cx="11887200" cy="5410712"/>
           </a:xfrm>
         </p:spPr>
         <p:txBody>
@@ -14222,58 +14060,117 @@
           <a:p>
             <a:r>
               <a:rPr lang="en-US" dirty="0"/>
-              <a:t>Rate My Talk &amp; Download Slides + Code!</a:t>
+              <a:t>Announcing the </a:t>
+            </a:r>
+            <a:r>
+              <a:rPr lang="en-US" dirty="0" err="1"/>
+              <a:t>EventSource</a:t>
+            </a:r>
+            <a:r>
+              <a:rPr lang="en-US" dirty="0"/>
+              <a:t> </a:t>
+            </a:r>
+            <a:r>
+              <a:rPr lang="en-US" dirty="0" err="1"/>
+              <a:t>NuGet</a:t>
+            </a:r>
+            <a:r>
+              <a:rPr lang="en-US" dirty="0"/>
+              <a:t> Package – Write to the Windows Event </a:t>
+            </a:r>
+            <a:r>
+              <a:rPr lang="en-US" dirty="0" smtClean="0"/>
+              <a:t>Log</a:t>
             </a:r>
           </a:p>
           <a:p>
             <a:pPr lvl="1"/>
             <a:r>
+              <a:rPr lang="en-US" dirty="0" smtClean="0">
+                <a:hlinkClick r:id="rId2"/>
+              </a:rPr>
+              <a:t>http</a:t>
+            </a:r>
+            <a:r>
+              <a:rPr lang="en-US" dirty="0">
+                <a:hlinkClick r:id="rId2"/>
+              </a:rPr>
+              <a:t>://</a:t>
+            </a:r>
+            <a:r>
+              <a:rPr lang="en-US" dirty="0" smtClean="0">
+                <a:hlinkClick r:id="rId2"/>
+              </a:rPr>
+              <a:t>blogs.msdn.com/b/dotnet/archive/2013/08/09/announcing-the-eventsource-nuget-package-write-to-the-windows-event-log.aspx</a:t>
+            </a:r>
+            <a:endParaRPr lang="en-US" dirty="0" smtClean="0"/>
+          </a:p>
+          <a:p>
+            <a:r>
               <a:rPr lang="en-US" dirty="0"/>
-              <a:t>http://tinyurl.com/RateShawn </a:t>
-            </a:r>
-          </a:p>
-          <a:p>
-            <a:r>
-              <a:rPr lang="en-US" dirty="0" smtClean="0"/>
-              <a:t>Contact </a:t>
-            </a:r>
+              <a:t>SLAB - Reactive Event Sourcing </a:t>
+            </a:r>
+            <a:endParaRPr lang="en-US" dirty="0" smtClean="0"/>
+          </a:p>
+          <a:p>
+            <a:pPr lvl="1"/>
+            <a:r>
+              <a:rPr lang="en-US" dirty="0">
+                <a:hlinkClick r:id="rId3"/>
+              </a:rPr>
+              <a:t>http://</a:t>
+            </a:r>
+            <a:r>
+              <a:rPr lang="en-US" dirty="0" smtClean="0">
+                <a:hlinkClick r:id="rId3"/>
+              </a:rPr>
+              <a:t>www.shujaat.net/2013/08/slab-reactive-event-sourcing.html</a:t>
+            </a:r>
+            <a:endParaRPr lang="en-US" dirty="0"/>
+          </a:p>
+          <a:p>
+            <a:pPr lvl="1"/>
             <a:r>
               <a:rPr lang="en-US" dirty="0"/>
-              <a:t>Information</a:t>
+              <a:t>Event listener is </a:t>
+            </a:r>
+            <a:r>
+              <a:rPr lang="en-US" dirty="0" err="1"/>
+              <a:t>IObservable</a:t>
+            </a:r>
+            <a:r>
+              <a:rPr lang="en-US" dirty="0"/>
+              <a:t>.</a:t>
             </a:r>
           </a:p>
           <a:p>
             <a:pPr lvl="1"/>
             <a:r>
-              <a:rPr lang="en-US" dirty="0" smtClean="0"/>
-              <a:t>Email: shawn@shawnweisfeld.com</a:t>
-            </a:r>
-            <a:endParaRPr lang="en-US" dirty="0"/>
+              <a:rPr lang="en-US" dirty="0"/>
+              <a:t>Event sinks are </a:t>
+            </a:r>
+            <a:r>
+              <a:rPr lang="en-US" dirty="0" err="1"/>
+              <a:t>IObservers</a:t>
+            </a:r>
+            <a:r>
+              <a:rPr lang="en-US" dirty="0"/>
+              <a:t>.</a:t>
+            </a:r>
           </a:p>
           <a:p>
             <a:pPr lvl="1"/>
             <a:r>
-              <a:rPr lang="en-US" dirty="0" smtClean="0"/>
-              <a:t>Blog: http</a:t>
-            </a:r>
-            <a:r>
               <a:rPr lang="en-US" dirty="0"/>
-              <a:t>://www.shawnweisfeld.com</a:t>
-            </a:r>
+              <a:t>Can leverage Reactive Extensions (Rx) to filter, pre-process or transform the event stream before it’s persisted.</a:t>
+            </a:r>
+          </a:p>
+          <a:p>
+            <a:pPr lvl="2"/>
+            <a:endParaRPr lang="en-US" dirty="0" smtClean="0"/>
           </a:p>
           <a:p>
             <a:pPr lvl="1"/>
-            <a:r>
-              <a:rPr lang="en-US" dirty="0" smtClean="0"/>
-              <a:t>Twitter: @</a:t>
-            </a:r>
-            <a:r>
-              <a:rPr lang="en-US" dirty="0" err="1" smtClean="0"/>
-              <a:t>shawnweisfeld</a:t>
-            </a:r>
-            <a:endParaRPr lang="en-US" dirty="0"/>
-          </a:p>
-          <a:p>
             <a:endParaRPr lang="en-US" dirty="0"/>
           </a:p>
         </p:txBody>
@@ -14295,7 +14192,7 @@
           <a:p>
             <a:r>
               <a:rPr lang="en-US" dirty="0" smtClean="0"/>
-              <a:t>Thank you! Your Feedback is Important</a:t>
+              <a:t>More Info</a:t>
             </a:r>
             <a:endParaRPr lang="en-US" dirty="0"/>
           </a:p>
@@ -14304,7 +14201,7 @@
     </p:spTree>
     <p:extLst>
       <p:ext uri="{BB962C8B-B14F-4D97-AF65-F5344CB8AC3E}">
-        <p14:creationId xmlns:p14="http://schemas.microsoft.com/office/powerpoint/2010/main" val="3494120760"/>
+        <p14:creationId xmlns:p14="http://schemas.microsoft.com/office/powerpoint/2010/main" val="1129073334"/>
       </p:ext>
     </p:extLst>
   </p:cSld>
@@ -14334,166 +14231,428 @@
           <a:chExt cx="0" cy="0"/>
         </a:xfrm>
       </p:grpSpPr>
-      <p:pic>
-        <p:nvPicPr>
-          <p:cNvPr id="4" name="Picture 3"/>
-          <p:cNvPicPr>
-            <a:picLocks noChangeAspect="1"/>
-          </p:cNvPicPr>
-          <p:nvPr/>
-        </p:nvPicPr>
-        <p:blipFill>
-          <a:blip r:embed="rId3">
-            <a:extLst>
-              <a:ext uri="{28A0092B-C50C-407E-A947-70E740481C1C}">
-                <a14:useLocalDpi xmlns:a14="http://schemas.microsoft.com/office/drawing/2010/main" val="0"/>
-              </a:ext>
-            </a:extLst>
-          </a:blip>
-          <a:stretch>
-            <a:fillRect/>
-          </a:stretch>
-        </p:blipFill>
-        <p:spPr bwMode="invGray">
-          <a:xfrm>
-            <a:off x="459230" y="3145040"/>
-            <a:ext cx="3288506" cy="704445"/>
-          </a:xfrm>
-          <a:prstGeom prst="rect">
-            <a:avLst/>
-          </a:prstGeom>
-        </p:spPr>
-      </p:pic>
       <p:sp>
         <p:nvSpPr>
-          <p:cNvPr id="5" name="Text Box 3"/>
-          <p:cNvSpPr txBox="1">
-            <a:spLocks noChangeArrowheads="1"/>
+          <p:cNvPr id="2" name="Text Placeholder 1"/>
+          <p:cNvSpPr>
+            <a:spLocks noGrp="1"/>
           </p:cNvSpPr>
-          <p:nvPr/>
+          <p:nvPr>
+            <p:ph type="body" sz="quarter" idx="10"/>
+          </p:nvPr>
         </p:nvSpPr>
-        <p:spPr bwMode="blackWhite">
+        <p:spPr>
           <a:xfrm>
-            <a:off x="273051" y="6079032"/>
-            <a:ext cx="10974388" cy="618631"/>
+            <a:off x="274638" y="1212850"/>
+            <a:ext cx="11887200" cy="4789003"/>
           </a:xfrm>
-          <a:prstGeom prst="rect">
-            <a:avLst/>
-          </a:prstGeom>
         </p:spPr>
         <p:txBody>
-          <a:bodyPr vert="horz" wrap="square" lIns="182880" tIns="146304" rIns="182880" bIns="146304" numCol="1" anchor="t" anchorCtr="0" compatLnSpc="1">
-            <a:prstTxWarp prst="textNoShape">
-              <a:avLst/>
-            </a:prstTxWarp>
-            <a:spAutoFit/>
-          </a:bodyPr>
+          <a:bodyPr/>
           <a:lstStyle/>
           <a:p>
-            <a:pPr defTabSz="932290" eaLnBrk="0" hangingPunct="0"/>
-            <a:r>
-              <a:rPr lang="en-US" sz="700" dirty="0">
-                <a:gradFill>
-                  <a:gsLst>
-                    <a:gs pos="0">
-                      <a:schemeClr val="tx1"/>
-                    </a:gs>
-                    <a:gs pos="100000">
-                      <a:schemeClr val="tx1"/>
-                    </a:gs>
-                  </a:gsLst>
-                  <a:lin ang="5400000" scaled="0"/>
-                </a:gradFill>
-                <a:cs typeface="Segoe UI" pitchFamily="34" charset="0"/>
+            <a:r>
+              <a:rPr lang="en-US" dirty="0"/>
+              <a:t>Semantic Logging Application Block (SLAB</a:t>
+            </a:r>
+            <a:r>
+              <a:rPr lang="en-US" dirty="0" smtClean="0"/>
+              <a:t>)</a:t>
+            </a:r>
+          </a:p>
+          <a:p>
+            <a:pPr lvl="1"/>
+            <a:r>
+              <a:rPr lang="en-US" dirty="0">
+                <a:hlinkClick r:id="rId2"/>
               </a:rPr>
-              <a:t>© </a:t>
-            </a:r>
-            <a:r>
-              <a:rPr lang="en-US" sz="700" dirty="0" smtClean="0">
-                <a:gradFill>
-                  <a:gsLst>
-                    <a:gs pos="0">
-                      <a:schemeClr val="tx1"/>
-                    </a:gs>
-                    <a:gs pos="100000">
-                      <a:schemeClr val="tx1"/>
-                    </a:gs>
-                  </a:gsLst>
-                  <a:lin ang="5400000" scaled="0"/>
-                </a:gradFill>
-                <a:cs typeface="Segoe UI" pitchFamily="34" charset="0"/>
+              <a:t>http://convective.wordpress.com/2013/08/12/semantic-logging-application-block-slab</a:t>
+            </a:r>
+            <a:r>
+              <a:rPr lang="en-US" dirty="0" smtClean="0">
+                <a:hlinkClick r:id="rId2"/>
               </a:rPr>
-              <a:t>2014 </a:t>
-            </a:r>
-            <a:r>
-              <a:rPr lang="en-US" sz="700" dirty="0">
-                <a:gradFill>
-                  <a:gsLst>
-                    <a:gs pos="0">
-                      <a:schemeClr val="tx1"/>
-                    </a:gs>
-                    <a:gs pos="100000">
-                      <a:schemeClr val="tx1"/>
-                    </a:gs>
-                  </a:gsLst>
-                  <a:lin ang="5400000" scaled="0"/>
-                </a:gradFill>
-                <a:cs typeface="Segoe UI" pitchFamily="34" charset="0"/>
+              <a:t>/</a:t>
+            </a:r>
+            <a:endParaRPr lang="en-US" dirty="0" smtClean="0"/>
+          </a:p>
+          <a:p>
+            <a:r>
+              <a:rPr lang="en-US" dirty="0"/>
+              <a:t>Semantic Logging Application Block (SLAB) </a:t>
+            </a:r>
+            <a:r>
+              <a:rPr lang="en-US" dirty="0" smtClean="0"/>
+              <a:t>1.1</a:t>
+            </a:r>
+          </a:p>
+          <a:p>
+            <a:pPr lvl="1"/>
+            <a:r>
+              <a:rPr lang="en-US" dirty="0">
+                <a:hlinkClick r:id="rId3"/>
               </a:rPr>
-              <a:t>Microsoft Corporation. All rights reserved. Microsoft, Windows, Windows Vista and other product names are or may be registered trademarks and/or trademarks in the U.S. and/or other countries.</a:t>
-            </a:r>
-          </a:p>
-          <a:p>
-            <a:pPr defTabSz="932290" eaLnBrk="0" hangingPunct="0"/>
-            <a:r>
-              <a:rPr lang="en-US" sz="700" dirty="0">
-                <a:gradFill>
-                  <a:gsLst>
-                    <a:gs pos="0">
-                      <a:schemeClr val="tx1"/>
-                    </a:gs>
-                    <a:gs pos="100000">
-                      <a:schemeClr val="tx1"/>
-                    </a:gs>
-                  </a:gsLst>
-                  <a:lin ang="5400000" scaled="0"/>
-                </a:gradFill>
-                <a:cs typeface="Segoe UI" pitchFamily="34" charset="0"/>
+              <a:t>https://</a:t>
+            </a:r>
+            <a:r>
+              <a:rPr lang="en-US" dirty="0" smtClean="0">
+                <a:hlinkClick r:id="rId3"/>
               </a:rPr>
-              <a:t>The information herein is for informational purposes only and represents the current view of Microsoft Corporation as of the date of this presentation.  Because Microsoft must respond to changing market conditions, it should not be interpreted to be a commitment on the part of Microsoft, and Microsoft cannot guarantee the accuracy of any information provided after the date of this presentation.  MICROSOFT MAKES NO WARRANTIES, EXPRESS, IMPLIED OR STATUTORY, AS TO THE INFORMATION IN THIS PRESENTATION.</a:t>
-            </a:r>
+              <a:t>slab.codeplex.com/wikipage?title=ActivityTracingAndSampling</a:t>
+            </a:r>
+            <a:r>
+              <a:rPr lang="en-US" dirty="0" smtClean="0"/>
+              <a:t> </a:t>
+            </a:r>
+          </a:p>
+          <a:p>
+            <a:pPr lvl="1"/>
+            <a:r>
+              <a:rPr lang="en-US" dirty="0" smtClean="0"/>
+              <a:t>Adds support for </a:t>
+            </a:r>
+            <a:r>
+              <a:rPr lang="en-US" dirty="0" err="1" smtClean="0"/>
+              <a:t>ActivityId</a:t>
+            </a:r>
+            <a:r>
+              <a:rPr lang="en-US" dirty="0" smtClean="0"/>
+              <a:t> </a:t>
+            </a:r>
+            <a:r>
+              <a:rPr lang="en-US" dirty="0"/>
+              <a:t>and </a:t>
+            </a:r>
+            <a:r>
+              <a:rPr lang="en-US" dirty="0" err="1"/>
+              <a:t>RelatedActivityId</a:t>
+            </a:r>
+            <a:r>
+              <a:rPr lang="en-US" dirty="0"/>
+              <a:t> </a:t>
+            </a:r>
+            <a:r>
+              <a:rPr lang="en-US" dirty="0" smtClean="0"/>
+              <a:t>allowing you to </a:t>
+            </a:r>
+            <a:r>
+              <a:rPr lang="en-US" dirty="0"/>
+              <a:t>correlate events </a:t>
+            </a:r>
+            <a:r>
+              <a:rPr lang="en-US" dirty="0" smtClean="0"/>
+              <a:t>between separate log messages</a:t>
+            </a:r>
+          </a:p>
+          <a:p>
+            <a:r>
+              <a:rPr lang="en-US" dirty="0" smtClean="0"/>
+              <a:t>SLAB on MSDN</a:t>
+            </a:r>
+          </a:p>
+          <a:p>
+            <a:pPr lvl="1"/>
+            <a:r>
+              <a:rPr lang="en-US" dirty="0">
+                <a:hlinkClick r:id="rId4"/>
+              </a:rPr>
+              <a:t>http://msdn.microsoft.com/en-us/library/dn440729(v=pandp.60).</a:t>
+            </a:r>
+            <a:r>
+              <a:rPr lang="en-US" dirty="0" smtClean="0">
+                <a:hlinkClick r:id="rId4"/>
+              </a:rPr>
+              <a:t>aspx</a:t>
+            </a:r>
+            <a:endParaRPr lang="en-US" dirty="0" smtClean="0"/>
+          </a:p>
+          <a:p>
+            <a:pPr lvl="1"/>
+            <a:r>
+              <a:rPr lang="en-US" dirty="0" smtClean="0"/>
+              <a:t>Sample Code and PDF book</a:t>
+            </a:r>
+            <a:endParaRPr lang="en-US" dirty="0"/>
+          </a:p>
+        </p:txBody>
+      </p:sp>
+      <p:sp>
+        <p:nvSpPr>
+          <p:cNvPr id="3" name="Title 2"/>
+          <p:cNvSpPr>
+            <a:spLocks noGrp="1"/>
+          </p:cNvSpPr>
+          <p:nvPr>
+            <p:ph type="title"/>
+          </p:nvPr>
+        </p:nvSpPr>
+        <p:spPr/>
+        <p:txBody>
+          <a:bodyPr/>
+          <a:lstStyle/>
+          <a:p>
+            <a:r>
+              <a:rPr lang="en-US" dirty="0" smtClean="0"/>
+              <a:t>More Info</a:t>
+            </a:r>
+            <a:endParaRPr lang="en-US" dirty="0"/>
           </a:p>
         </p:txBody>
       </p:sp>
     </p:spTree>
     <p:extLst>
       <p:ext uri="{BB962C8B-B14F-4D97-AF65-F5344CB8AC3E}">
-        <p14:creationId xmlns:p14="http://schemas.microsoft.com/office/powerpoint/2010/main" val="2972243654"/>
+        <p14:creationId xmlns:p14="http://schemas.microsoft.com/office/powerpoint/2010/main" val="3583086404"/>
       </p:ext>
     </p:extLst>
   </p:cSld>
   <p:clrMapOvr>
     <a:masterClrMapping/>
   </p:clrMapOvr>
-  <mc:AlternateContent xmlns:mc="http://schemas.openxmlformats.org/markup-compatibility/2006" xmlns:p14="http://schemas.microsoft.com/office/powerpoint/2010/main">
-    <mc:Choice Requires="p14">
-      <p:transition spd="med" p14:dur="700">
-        <p:fade/>
-      </p:transition>
-    </mc:Choice>
-    <mc:Fallback xmlns="">
-      <p:transition spd="med">
-        <p:fade/>
-      </p:transition>
-    </mc:Fallback>
-  </mc:AlternateContent>
-  <p:timing>
-    <p:tnLst>
-      <p:par>
-        <p:cTn id="1" dur="indefinite" restart="never" nodeType="tmRoot"/>
-      </p:par>
-    </p:tnLst>
-  </p:timing>
+  <p:transition>
+    <p:fade/>
+  </p:transition>
+</p:sld>
+</file>
+
+<file path=ppt/slides/slide28.xml><?xml version="1.0" encoding="utf-8"?>
+<p:sld xmlns:a="http://schemas.openxmlformats.org/drawingml/2006/main" xmlns:r="http://schemas.openxmlformats.org/officeDocument/2006/relationships" xmlns:p="http://schemas.openxmlformats.org/presentationml/2006/main">
+  <p:cSld>
+    <p:spTree>
+      <p:nvGrpSpPr>
+        <p:cNvPr id="1" name=""/>
+        <p:cNvGrpSpPr/>
+        <p:nvPr/>
+      </p:nvGrpSpPr>
+      <p:grpSpPr>
+        <a:xfrm>
+          <a:off x="0" y="0"/>
+          <a:ext cx="0" cy="0"/>
+          <a:chOff x="0" y="0"/>
+          <a:chExt cx="0" cy="0"/>
+        </a:xfrm>
+      </p:grpSpPr>
+      <p:sp>
+        <p:nvSpPr>
+          <p:cNvPr id="2" name="Text Placeholder 1"/>
+          <p:cNvSpPr>
+            <a:spLocks noGrp="1"/>
+          </p:cNvSpPr>
+          <p:nvPr>
+            <p:ph type="body" sz="quarter" idx="10"/>
+          </p:nvPr>
+        </p:nvSpPr>
+        <p:spPr>
+          <a:xfrm>
+            <a:off x="274638" y="1212850"/>
+            <a:ext cx="11887200" cy="2215991"/>
+          </a:xfrm>
+        </p:spPr>
+        <p:txBody>
+          <a:bodyPr/>
+          <a:lstStyle/>
+          <a:p>
+            <a:r>
+              <a:rPr lang="en-US" dirty="0" err="1" smtClean="0"/>
+              <a:t>EventSorce</a:t>
+            </a:r>
+            <a:r>
+              <a:rPr lang="en-US" dirty="0" smtClean="0"/>
+              <a:t>: Everything you ever wanted to know</a:t>
+            </a:r>
+          </a:p>
+          <a:p>
+            <a:pPr lvl="1"/>
+            <a:r>
+              <a:rPr lang="en-US" dirty="0">
+                <a:hlinkClick r:id="rId2"/>
+              </a:rPr>
+              <a:t>http://view.officeapps.live.com/op/view.aspx?src=http%3A%2F%2Fblogs.msdn.com%2Fcfs-filesystemfile.ashx%2F__</a:t>
+            </a:r>
+            <a:r>
+              <a:rPr lang="en-US" dirty="0" smtClean="0">
+                <a:hlinkClick r:id="rId2"/>
+              </a:rPr>
+              <a:t>key%2Fcommunityserver-components-postattachments%2F00-10-44-08-22%2F_5F00_EventSourceUsersGuide.docx</a:t>
+            </a:r>
+            <a:endParaRPr lang="en-US" dirty="0" smtClean="0"/>
+          </a:p>
+          <a:p>
+            <a:pPr lvl="1"/>
+            <a:endParaRPr lang="en-US" dirty="0"/>
+          </a:p>
+        </p:txBody>
+      </p:sp>
+      <p:sp>
+        <p:nvSpPr>
+          <p:cNvPr id="3" name="Title 2"/>
+          <p:cNvSpPr>
+            <a:spLocks noGrp="1"/>
+          </p:cNvSpPr>
+          <p:nvPr>
+            <p:ph type="title"/>
+          </p:nvPr>
+        </p:nvSpPr>
+        <p:spPr/>
+        <p:txBody>
+          <a:bodyPr/>
+          <a:lstStyle/>
+          <a:p>
+            <a:r>
+              <a:rPr lang="en-US" dirty="0" smtClean="0"/>
+              <a:t>More Info</a:t>
+            </a:r>
+            <a:endParaRPr lang="en-US" dirty="0"/>
+          </a:p>
+        </p:txBody>
+      </p:sp>
+    </p:spTree>
+    <p:extLst>
+      <p:ext uri="{BB962C8B-B14F-4D97-AF65-F5344CB8AC3E}">
+        <p14:creationId xmlns:p14="http://schemas.microsoft.com/office/powerpoint/2010/main" val="3273215982"/>
+      </p:ext>
+    </p:extLst>
+  </p:cSld>
+  <p:clrMapOvr>
+    <a:masterClrMapping/>
+  </p:clrMapOvr>
+  <p:transition>
+    <p:fade/>
+  </p:transition>
+</p:sld>
+</file>
+
+<file path=ppt/slides/slide29.xml><?xml version="1.0" encoding="utf-8"?>
+<p:sld xmlns:a="http://schemas.openxmlformats.org/drawingml/2006/main" xmlns:r="http://schemas.openxmlformats.org/officeDocument/2006/relationships" xmlns:p="http://schemas.openxmlformats.org/presentationml/2006/main">
+  <p:cSld>
+    <p:spTree>
+      <p:nvGrpSpPr>
+        <p:cNvPr id="1" name=""/>
+        <p:cNvGrpSpPr/>
+        <p:nvPr/>
+      </p:nvGrpSpPr>
+      <p:grpSpPr>
+        <a:xfrm>
+          <a:off x="0" y="0"/>
+          <a:ext cx="0" cy="0"/>
+          <a:chOff x="0" y="0"/>
+          <a:chExt cx="0" cy="0"/>
+        </a:xfrm>
+      </p:grpSpPr>
+      <p:sp>
+        <p:nvSpPr>
+          <p:cNvPr id="2" name="Text Placeholder 1"/>
+          <p:cNvSpPr>
+            <a:spLocks noGrp="1"/>
+          </p:cNvSpPr>
+          <p:nvPr>
+            <p:ph type="body" sz="quarter" idx="10"/>
+          </p:nvPr>
+        </p:nvSpPr>
+        <p:spPr>
+          <a:xfrm>
+            <a:off x="274638" y="1212850"/>
+            <a:ext cx="11887200" cy="3717941"/>
+          </a:xfrm>
+        </p:spPr>
+        <p:txBody>
+          <a:bodyPr/>
+          <a:lstStyle/>
+          <a:p>
+            <a:r>
+              <a:rPr lang="en-US" dirty="0"/>
+              <a:t>Rate My Talk &amp; Download Slides + Code!</a:t>
+            </a:r>
+          </a:p>
+          <a:p>
+            <a:pPr lvl="1"/>
+            <a:r>
+              <a:rPr lang="en-US" dirty="0"/>
+              <a:t>http://tinyurl.com/RateShawn </a:t>
+            </a:r>
+          </a:p>
+          <a:p>
+            <a:r>
+              <a:rPr lang="en-US" dirty="0" smtClean="0"/>
+              <a:t>Contact </a:t>
+            </a:r>
+            <a:r>
+              <a:rPr lang="en-US" dirty="0"/>
+              <a:t>Information</a:t>
+            </a:r>
+          </a:p>
+          <a:p>
+            <a:pPr lvl="1"/>
+            <a:r>
+              <a:rPr lang="en-US" dirty="0" smtClean="0"/>
+              <a:t>Email: shawn@shawnweisfeld.com</a:t>
+            </a:r>
+            <a:endParaRPr lang="en-US" dirty="0"/>
+          </a:p>
+          <a:p>
+            <a:pPr lvl="1"/>
+            <a:r>
+              <a:rPr lang="en-US" dirty="0" smtClean="0"/>
+              <a:t>Blog: http</a:t>
+            </a:r>
+            <a:r>
+              <a:rPr lang="en-US" dirty="0"/>
+              <a:t>://www.shawnweisfeld.com</a:t>
+            </a:r>
+          </a:p>
+          <a:p>
+            <a:pPr lvl="1"/>
+            <a:r>
+              <a:rPr lang="en-US" dirty="0" smtClean="0"/>
+              <a:t>Twitter: @</a:t>
+            </a:r>
+            <a:r>
+              <a:rPr lang="en-US" dirty="0" err="1" smtClean="0"/>
+              <a:t>shawnweisfeld</a:t>
+            </a:r>
+            <a:endParaRPr lang="en-US" dirty="0"/>
+          </a:p>
+          <a:p>
+            <a:endParaRPr lang="en-US" dirty="0"/>
+          </a:p>
+        </p:txBody>
+      </p:sp>
+      <p:sp>
+        <p:nvSpPr>
+          <p:cNvPr id="3" name="Title 2"/>
+          <p:cNvSpPr>
+            <a:spLocks noGrp="1"/>
+          </p:cNvSpPr>
+          <p:nvPr>
+            <p:ph type="title"/>
+          </p:nvPr>
+        </p:nvSpPr>
+        <p:spPr/>
+        <p:txBody>
+          <a:bodyPr/>
+          <a:lstStyle/>
+          <a:p>
+            <a:r>
+              <a:rPr lang="en-US" dirty="0" smtClean="0"/>
+              <a:t>Thank you! Your Feedback is Important</a:t>
+            </a:r>
+            <a:endParaRPr lang="en-US" dirty="0"/>
+          </a:p>
+        </p:txBody>
+      </p:sp>
+    </p:spTree>
+    <p:extLst>
+      <p:ext uri="{BB962C8B-B14F-4D97-AF65-F5344CB8AC3E}">
+        <p14:creationId xmlns:p14="http://schemas.microsoft.com/office/powerpoint/2010/main" val="3494120760"/>
+      </p:ext>
+    </p:extLst>
+  </p:cSld>
+  <p:clrMapOvr>
+    <a:masterClrMapping/>
+  </p:clrMapOvr>
+  <p:transition>
+    <p:fade/>
+  </p:transition>
 </p:sld>
 </file>
 
@@ -15104,6 +15263,186 @@
 </p:sld>
 </file>
 
+<file path=ppt/slides/slide30.xml><?xml version="1.0" encoding="utf-8"?>
+<p:sld xmlns:a="http://schemas.openxmlformats.org/drawingml/2006/main" xmlns:r="http://schemas.openxmlformats.org/officeDocument/2006/relationships" xmlns:p="http://schemas.openxmlformats.org/presentationml/2006/main">
+  <p:cSld>
+    <p:spTree>
+      <p:nvGrpSpPr>
+        <p:cNvPr id="1" name=""/>
+        <p:cNvGrpSpPr/>
+        <p:nvPr/>
+      </p:nvGrpSpPr>
+      <p:grpSpPr>
+        <a:xfrm>
+          <a:off x="0" y="0"/>
+          <a:ext cx="0" cy="0"/>
+          <a:chOff x="0" y="0"/>
+          <a:chExt cx="0" cy="0"/>
+        </a:xfrm>
+      </p:grpSpPr>
+      <p:pic>
+        <p:nvPicPr>
+          <p:cNvPr id="4" name="Picture 3"/>
+          <p:cNvPicPr>
+            <a:picLocks noChangeAspect="1"/>
+          </p:cNvPicPr>
+          <p:nvPr/>
+        </p:nvPicPr>
+        <p:blipFill>
+          <a:blip r:embed="rId3">
+            <a:extLst>
+              <a:ext uri="{28A0092B-C50C-407E-A947-70E740481C1C}">
+                <a14:useLocalDpi xmlns:a14="http://schemas.microsoft.com/office/drawing/2010/main" val="0"/>
+              </a:ext>
+            </a:extLst>
+          </a:blip>
+          <a:stretch>
+            <a:fillRect/>
+          </a:stretch>
+        </p:blipFill>
+        <p:spPr bwMode="invGray">
+          <a:xfrm>
+            <a:off x="459230" y="3145040"/>
+            <a:ext cx="3288506" cy="704445"/>
+          </a:xfrm>
+          <a:prstGeom prst="rect">
+            <a:avLst/>
+          </a:prstGeom>
+        </p:spPr>
+      </p:pic>
+      <p:sp>
+        <p:nvSpPr>
+          <p:cNvPr id="5" name="Text Box 3"/>
+          <p:cNvSpPr txBox="1">
+            <a:spLocks noChangeArrowheads="1"/>
+          </p:cNvSpPr>
+          <p:nvPr/>
+        </p:nvSpPr>
+        <p:spPr bwMode="blackWhite">
+          <a:xfrm>
+            <a:off x="273051" y="6079032"/>
+            <a:ext cx="10974388" cy="618631"/>
+          </a:xfrm>
+          <a:prstGeom prst="rect">
+            <a:avLst/>
+          </a:prstGeom>
+        </p:spPr>
+        <p:txBody>
+          <a:bodyPr vert="horz" wrap="square" lIns="182880" tIns="146304" rIns="182880" bIns="146304" numCol="1" anchor="t" anchorCtr="0" compatLnSpc="1">
+            <a:prstTxWarp prst="textNoShape">
+              <a:avLst/>
+            </a:prstTxWarp>
+            <a:spAutoFit/>
+          </a:bodyPr>
+          <a:lstStyle/>
+          <a:p>
+            <a:pPr defTabSz="932290" eaLnBrk="0" hangingPunct="0"/>
+            <a:r>
+              <a:rPr lang="en-US" sz="700" dirty="0">
+                <a:gradFill>
+                  <a:gsLst>
+                    <a:gs pos="0">
+                      <a:schemeClr val="tx1"/>
+                    </a:gs>
+                    <a:gs pos="100000">
+                      <a:schemeClr val="tx1"/>
+                    </a:gs>
+                  </a:gsLst>
+                  <a:lin ang="5400000" scaled="0"/>
+                </a:gradFill>
+                <a:cs typeface="Segoe UI" pitchFamily="34" charset="0"/>
+              </a:rPr>
+              <a:t>© </a:t>
+            </a:r>
+            <a:r>
+              <a:rPr lang="en-US" sz="700" dirty="0" smtClean="0">
+                <a:gradFill>
+                  <a:gsLst>
+                    <a:gs pos="0">
+                      <a:schemeClr val="tx1"/>
+                    </a:gs>
+                    <a:gs pos="100000">
+                      <a:schemeClr val="tx1"/>
+                    </a:gs>
+                  </a:gsLst>
+                  <a:lin ang="5400000" scaled="0"/>
+                </a:gradFill>
+                <a:cs typeface="Segoe UI" pitchFamily="34" charset="0"/>
+              </a:rPr>
+              <a:t>2014 </a:t>
+            </a:r>
+            <a:r>
+              <a:rPr lang="en-US" sz="700" dirty="0">
+                <a:gradFill>
+                  <a:gsLst>
+                    <a:gs pos="0">
+                      <a:schemeClr val="tx1"/>
+                    </a:gs>
+                    <a:gs pos="100000">
+                      <a:schemeClr val="tx1"/>
+                    </a:gs>
+                  </a:gsLst>
+                  <a:lin ang="5400000" scaled="0"/>
+                </a:gradFill>
+                <a:cs typeface="Segoe UI" pitchFamily="34" charset="0"/>
+              </a:rPr>
+              <a:t>Microsoft Corporation. All rights reserved. Microsoft, Windows, Windows Vista and other product names are or may be registered trademarks and/or trademarks in the U.S. and/or other countries.</a:t>
+            </a:r>
+          </a:p>
+          <a:p>
+            <a:pPr defTabSz="932290" eaLnBrk="0" hangingPunct="0"/>
+            <a:r>
+              <a:rPr lang="en-US" sz="700" dirty="0">
+                <a:gradFill>
+                  <a:gsLst>
+                    <a:gs pos="0">
+                      <a:schemeClr val="tx1"/>
+                    </a:gs>
+                    <a:gs pos="100000">
+                      <a:schemeClr val="tx1"/>
+                    </a:gs>
+                  </a:gsLst>
+                  <a:lin ang="5400000" scaled="0"/>
+                </a:gradFill>
+                <a:cs typeface="Segoe UI" pitchFamily="34" charset="0"/>
+              </a:rPr>
+              <a:t>The information herein is for informational purposes only and represents the current view of Microsoft Corporation as of the date of this presentation.  Because Microsoft must respond to changing market conditions, it should not be interpreted to be a commitment on the part of Microsoft, and Microsoft cannot guarantee the accuracy of any information provided after the date of this presentation.  MICROSOFT MAKES NO WARRANTIES, EXPRESS, IMPLIED OR STATUTORY, AS TO THE INFORMATION IN THIS PRESENTATION.</a:t>
+            </a:r>
+          </a:p>
+        </p:txBody>
+      </p:sp>
+    </p:spTree>
+    <p:extLst>
+      <p:ext uri="{BB962C8B-B14F-4D97-AF65-F5344CB8AC3E}">
+        <p14:creationId xmlns:p14="http://schemas.microsoft.com/office/powerpoint/2010/main" val="2972243654"/>
+      </p:ext>
+    </p:extLst>
+  </p:cSld>
+  <p:clrMapOvr>
+    <a:masterClrMapping/>
+  </p:clrMapOvr>
+  <mc:AlternateContent xmlns:mc="http://schemas.openxmlformats.org/markup-compatibility/2006" xmlns:p14="http://schemas.microsoft.com/office/powerpoint/2010/main">
+    <mc:Choice Requires="p14">
+      <p:transition spd="med" p14:dur="700">
+        <p:fade/>
+      </p:transition>
+    </mc:Choice>
+    <mc:Fallback xmlns="">
+      <p:transition spd="med">
+        <p:fade/>
+      </p:transition>
+    </mc:Fallback>
+  </mc:AlternateContent>
+  <p:timing>
+    <p:tnLst>
+      <p:par>
+        <p:cTn id="1" dur="indefinite" restart="never" nodeType="tmRoot"/>
+      </p:par>
+    </p:tnLst>
+  </p:timing>
+</p:sld>
+</file>
+
 <file path=ppt/slides/slide4.xml><?xml version="1.0" encoding="utf-8"?>
 <p:sld xmlns:a="http://schemas.openxmlformats.org/drawingml/2006/main" xmlns:r="http://schemas.openxmlformats.org/officeDocument/2006/relationships" xmlns:p="http://schemas.openxmlformats.org/presentationml/2006/main">
   <p:cSld>
@@ -15734,13 +16073,8 @@
           <a:p>
             <a:r>
               <a:rPr lang="en-US" dirty="0" smtClean="0"/>
-              <a:t>Make it easier to </a:t>
-            </a:r>
-            <a:r>
-              <a:rPr lang="en-US" dirty="0" smtClean="0"/>
-              <a:t>read logs</a:t>
-            </a:r>
-            <a:endParaRPr lang="en-US" dirty="0" smtClean="0"/>
+              <a:t>Make it easier to read logs</a:t>
+            </a:r>
           </a:p>
           <a:p>
             <a:r>
@@ -16696,6 +17030,21 @@
 </file>
 
 <file path=customXml/item1.xml><?xml version="1.0" encoding="utf-8"?>
+<?mso-contentType ?>
+<FormTemplates xmlns="http://schemas.microsoft.com/sharepoint/v3/contenttype/forms">
+  <Display>DocumentLibraryForm</Display>
+  <Edit>DocumentLibraryForm</Edit>
+  <New>DocumentLibraryForm</New>
+</FormTemplates>
+</file>
+
+<file path=customXml/item2.xml><?xml version="1.0" encoding="utf-8"?>
+<p:properties xmlns:p="http://schemas.microsoft.com/office/2006/metadata/properties" xmlns:xsi="http://www.w3.org/2001/XMLSchema-instance" xmlns:pc="http://schemas.microsoft.com/office/infopath/2007/PartnerControls">
+  <documentManagement/>
+</p:properties>
+</file>
+
+<file path=customXml/item3.xml><?xml version="1.0" encoding="utf-8"?>
 <ct:contentTypeSchema xmlns:ct="http://schemas.microsoft.com/office/2006/metadata/contentType" xmlns:ma="http://schemas.microsoft.com/office/2006/metadata/properties/metaAttributes" ct:_="" ma:_="" ma:contentTypeName="Document" ma:contentTypeID="0x0101000C049DA7A73EE242829E58F5D11C9B89" ma:contentTypeVersion="1" ma:contentTypeDescription="Create a new document." ma:contentTypeScope="" ma:versionID="f852d6fc607bed850fe4acc5f09870c6">
   <xsd:schema xmlns:xsd="http://www.w3.org/2001/XMLSchema" xmlns:xs="http://www.w3.org/2001/XMLSchema" xmlns:p="http://schemas.microsoft.com/office/2006/metadata/properties" xmlns:ns3="ecfee87f-bec7-4f31-8aee-ff5312e7eacf" targetNamespace="http://schemas.microsoft.com/office/2006/metadata/properties" ma:root="true" ma:fieldsID="e65437c189d7469ff474ec03e241c9af" ns3:_="">
     <xsd:import namespace="ecfee87f-bec7-4f31-8aee-ff5312e7eacf"/>
@@ -16835,35 +17184,10 @@
 </ct:contentTypeSchema>
 </file>
 
-<file path=customXml/item2.xml><?xml version="1.0" encoding="utf-8"?>
-<p:properties xmlns:p="http://schemas.microsoft.com/office/2006/metadata/properties" xmlns:xsi="http://www.w3.org/2001/XMLSchema-instance" xmlns:pc="http://schemas.microsoft.com/office/infopath/2007/PartnerControls">
-  <documentManagement/>
-</p:properties>
-</file>
-
-<file path=customXml/item3.xml><?xml version="1.0" encoding="utf-8"?>
-<?mso-contentType ?>
-<FormTemplates xmlns="http://schemas.microsoft.com/sharepoint/v3/contenttype/forms">
-  <Display>DocumentLibraryForm</Display>
-  <Edit>DocumentLibraryForm</Edit>
-  <New>DocumentLibraryForm</New>
-</FormTemplates>
-</file>
-
 <file path=customXml/itemProps1.xml><?xml version="1.0" encoding="utf-8"?>
-<ds:datastoreItem xmlns:ds="http://schemas.openxmlformats.org/officeDocument/2006/customXml" ds:itemID="{7C8A941E-1B3D-4164-9DD8-AFD369229724}">
+<ds:datastoreItem xmlns:ds="http://schemas.openxmlformats.org/officeDocument/2006/customXml" ds:itemID="{758FDAC0-319D-4A54-8D8E-1D42CB1F8004}">
   <ds:schemaRefs>
-    <ds:schemaRef ds:uri="http://schemas.microsoft.com/office/2006/metadata/contentType"/>
-    <ds:schemaRef ds:uri="http://schemas.microsoft.com/office/2006/metadata/properties/metaAttributes"/>
-    <ds:schemaRef ds:uri="http://www.w3.org/2001/XMLSchema"/>
-    <ds:schemaRef ds:uri="http://schemas.microsoft.com/office/2006/metadata/properties"/>
-    <ds:schemaRef ds:uri="ecfee87f-bec7-4f31-8aee-ff5312e7eacf"/>
-    <ds:schemaRef ds:uri="http://schemas.microsoft.com/office/2006/documentManagement/types"/>
-    <ds:schemaRef ds:uri="http://schemas.microsoft.com/office/infopath/2007/PartnerControls"/>
-    <ds:schemaRef ds:uri="http://schemas.openxmlformats.org/package/2006/metadata/core-properties"/>
-    <ds:schemaRef ds:uri="http://purl.org/dc/elements/1.1/"/>
-    <ds:schemaRef ds:uri="http://purl.org/dc/terms/"/>
-    <ds:schemaRef ds:uri="http://schemas.microsoft.com/internal/obd"/>
+    <ds:schemaRef ds:uri="http://schemas.microsoft.com/sharepoint/v3/contenttype/forms"/>
   </ds:schemaRefs>
 </ds:datastoreItem>
 </file>
@@ -16885,9 +17209,19 @@
 </file>
 
 <file path=customXml/itemProps3.xml><?xml version="1.0" encoding="utf-8"?>
-<ds:datastoreItem xmlns:ds="http://schemas.openxmlformats.org/officeDocument/2006/customXml" ds:itemID="{758FDAC0-319D-4A54-8D8E-1D42CB1F8004}">
+<ds:datastoreItem xmlns:ds="http://schemas.openxmlformats.org/officeDocument/2006/customXml" ds:itemID="{7C8A941E-1B3D-4164-9DD8-AFD369229724}">
   <ds:schemaRefs>
-    <ds:schemaRef ds:uri="http://schemas.microsoft.com/sharepoint/v3/contenttype/forms"/>
+    <ds:schemaRef ds:uri="http://schemas.microsoft.com/office/2006/metadata/contentType"/>
+    <ds:schemaRef ds:uri="http://schemas.microsoft.com/office/2006/metadata/properties/metaAttributes"/>
+    <ds:schemaRef ds:uri="http://www.w3.org/2001/XMLSchema"/>
+    <ds:schemaRef ds:uri="http://schemas.microsoft.com/office/2006/metadata/properties"/>
+    <ds:schemaRef ds:uri="ecfee87f-bec7-4f31-8aee-ff5312e7eacf"/>
+    <ds:schemaRef ds:uri="http://schemas.microsoft.com/office/2006/documentManagement/types"/>
+    <ds:schemaRef ds:uri="http://schemas.microsoft.com/office/infopath/2007/PartnerControls"/>
+    <ds:schemaRef ds:uri="http://schemas.openxmlformats.org/package/2006/metadata/core-properties"/>
+    <ds:schemaRef ds:uri="http://purl.org/dc/elements/1.1/"/>
+    <ds:schemaRef ds:uri="http://purl.org/dc/terms/"/>
+    <ds:schemaRef ds:uri="http://schemas.microsoft.com/internal/obd"/>
   </ds:schemaRefs>
 </ds:datastoreItem>
 </file>
</xml_diff>